<commit_message>
Work on lessons 1 and 2.
</commit_message>
<xml_diff>
--- a/Presentation1.pptx
+++ b/Presentation1.pptx
@@ -5,7 +5,7 @@
     <p:sldMasterId id="2147483648" r:id="rId1"/>
   </p:sldMasterIdLst>
   <p:notesMasterIdLst>
-    <p:notesMasterId r:id="rId8"/>
+    <p:notesMasterId r:id="rId20"/>
   </p:notesMasterIdLst>
   <p:sldIdLst>
     <p:sldId id="256" r:id="rId2"/>
@@ -14,6 +14,18 @@
     <p:sldId id="260" r:id="rId5"/>
     <p:sldId id="262" r:id="rId6"/>
     <p:sldId id="261" r:id="rId7"/>
+    <p:sldId id="263" r:id="rId8"/>
+    <p:sldId id="265" r:id="rId9"/>
+    <p:sldId id="268" r:id="rId10"/>
+    <p:sldId id="269" r:id="rId11"/>
+    <p:sldId id="264" r:id="rId12"/>
+    <p:sldId id="266" r:id="rId13"/>
+    <p:sldId id="267" r:id="rId14"/>
+    <p:sldId id="270" r:id="rId15"/>
+    <p:sldId id="271" r:id="rId16"/>
+    <p:sldId id="272" r:id="rId17"/>
+    <p:sldId id="273" r:id="rId18"/>
+    <p:sldId id="276" r:id="rId19"/>
   </p:sldIdLst>
   <p:sldSz cx="12192000" cy="6858000"/>
   <p:notesSz cx="6858000" cy="9144000"/>
@@ -112,6 +124,11 @@
       </a:defRPr>
     </a:lvl9pPr>
   </p:defaultTextStyle>
+  <p:extLst>
+    <p:ext uri="{EFAFB233-063F-42B5-8137-9DF3F51BA10A}">
+      <p15:sldGuideLst xmlns:p15="http://schemas.microsoft.com/office/powerpoint/2012/main"/>
+    </p:ext>
+  </p:extLst>
 </p:presentation>
 </file>
 
@@ -197,7 +214,7 @@
           <a:p>
             <a:fld id="{6BEEFB0F-FC82-F341-8F73-F9813FD8CB1C}" type="datetimeFigureOut">
               <a:rPr lang="en-US" smtClean="0"/>
-              <a:t>10/6/18</a:t>
+              <a:t>10/7/18</a:t>
             </a:fld>
             <a:endParaRPr lang="en-US"/>
           </a:p>
@@ -596,7 +613,7 @@
           <a:p>
             <a:fld id="{5DA7BCF0-81A2-F14F-9732-11E21E99EC3D}" type="datetimeFigureOut">
               <a:rPr lang="en-US" smtClean="0"/>
-              <a:t>10/6/18</a:t>
+              <a:t>10/7/18</a:t>
             </a:fld>
             <a:endParaRPr lang="en-US"/>
           </a:p>
@@ -766,7 +783,7 @@
           <a:p>
             <a:fld id="{5DA7BCF0-81A2-F14F-9732-11E21E99EC3D}" type="datetimeFigureOut">
               <a:rPr lang="en-US" smtClean="0"/>
-              <a:t>10/6/18</a:t>
+              <a:t>10/7/18</a:t>
             </a:fld>
             <a:endParaRPr lang="en-US"/>
           </a:p>
@@ -946,7 +963,7 @@
           <a:p>
             <a:fld id="{5DA7BCF0-81A2-F14F-9732-11E21E99EC3D}" type="datetimeFigureOut">
               <a:rPr lang="en-US" smtClean="0"/>
-              <a:t>10/6/18</a:t>
+              <a:t>10/7/18</a:t>
             </a:fld>
             <a:endParaRPr lang="en-US"/>
           </a:p>
@@ -1116,7 +1133,7 @@
           <a:p>
             <a:fld id="{5DA7BCF0-81A2-F14F-9732-11E21E99EC3D}" type="datetimeFigureOut">
               <a:rPr lang="en-US" smtClean="0"/>
-              <a:t>10/6/18</a:t>
+              <a:t>10/7/18</a:t>
             </a:fld>
             <a:endParaRPr lang="en-US"/>
           </a:p>
@@ -1362,7 +1379,7 @@
           <a:p>
             <a:fld id="{5DA7BCF0-81A2-F14F-9732-11E21E99EC3D}" type="datetimeFigureOut">
               <a:rPr lang="en-US" smtClean="0"/>
-              <a:t>10/6/18</a:t>
+              <a:t>10/7/18</a:t>
             </a:fld>
             <a:endParaRPr lang="en-US"/>
           </a:p>
@@ -1594,7 +1611,7 @@
           <a:p>
             <a:fld id="{5DA7BCF0-81A2-F14F-9732-11E21E99EC3D}" type="datetimeFigureOut">
               <a:rPr lang="en-US" smtClean="0"/>
-              <a:t>10/6/18</a:t>
+              <a:t>10/7/18</a:t>
             </a:fld>
             <a:endParaRPr lang="en-US"/>
           </a:p>
@@ -1961,7 +1978,7 @@
           <a:p>
             <a:fld id="{5DA7BCF0-81A2-F14F-9732-11E21E99EC3D}" type="datetimeFigureOut">
               <a:rPr lang="en-US" smtClean="0"/>
-              <a:t>10/6/18</a:t>
+              <a:t>10/7/18</a:t>
             </a:fld>
             <a:endParaRPr lang="en-US"/>
           </a:p>
@@ -2079,7 +2096,7 @@
           <a:p>
             <a:fld id="{5DA7BCF0-81A2-F14F-9732-11E21E99EC3D}" type="datetimeFigureOut">
               <a:rPr lang="en-US" smtClean="0"/>
-              <a:t>10/6/18</a:t>
+              <a:t>10/7/18</a:t>
             </a:fld>
             <a:endParaRPr lang="en-US"/>
           </a:p>
@@ -2174,7 +2191,7 @@
           <a:p>
             <a:fld id="{5DA7BCF0-81A2-F14F-9732-11E21E99EC3D}" type="datetimeFigureOut">
               <a:rPr lang="en-US" smtClean="0"/>
-              <a:t>10/6/18</a:t>
+              <a:t>10/7/18</a:t>
             </a:fld>
             <a:endParaRPr lang="en-US"/>
           </a:p>
@@ -2451,7 +2468,7 @@
           <a:p>
             <a:fld id="{5DA7BCF0-81A2-F14F-9732-11E21E99EC3D}" type="datetimeFigureOut">
               <a:rPr lang="en-US" smtClean="0"/>
-              <a:t>10/6/18</a:t>
+              <a:t>10/7/18</a:t>
             </a:fld>
             <a:endParaRPr lang="en-US"/>
           </a:p>
@@ -2704,7 +2721,7 @@
           <a:p>
             <a:fld id="{5DA7BCF0-81A2-F14F-9732-11E21E99EC3D}" type="datetimeFigureOut">
               <a:rPr lang="en-US" smtClean="0"/>
-              <a:t>10/6/18</a:t>
+              <a:t>10/7/18</a:t>
             </a:fld>
             <a:endParaRPr lang="en-US"/>
           </a:p>
@@ -2917,7 +2934,7 @@
           <a:p>
             <a:fld id="{5DA7BCF0-81A2-F14F-9732-11E21E99EC3D}" type="datetimeFigureOut">
               <a:rPr lang="en-US" smtClean="0"/>
-              <a:t>10/6/18</a:t>
+              <a:t>10/7/18</a:t>
             </a:fld>
             <a:endParaRPr lang="en-US"/>
           </a:p>
@@ -3395,11 +3412,11 @@
   <p:clrMapOvr>
     <a:masterClrMapping/>
   </p:clrMapOvr>
-  <mc:AlternateContent xmlns:mc="http://schemas.openxmlformats.org/markup-compatibility/2006">
-    <mc:Choice xmlns:p14="http://schemas.microsoft.com/office/powerpoint/2010/main" Requires="p14">
+  <mc:AlternateContent xmlns:mc="http://schemas.openxmlformats.org/markup-compatibility/2006" xmlns:p14="http://schemas.microsoft.com/office/powerpoint/2010/main">
+    <mc:Choice Requires="p14">
       <p:transition spd="slow" p14:dur="2000" advTm="8436"/>
     </mc:Choice>
-    <mc:Fallback>
+    <mc:Fallback xmlns="">
       <p:transition spd="slow" advTm="8436"/>
     </mc:Fallback>
   </mc:AlternateContent>
@@ -3493,6 +3510,1417 @@
 </p:sld>
 </file>
 
+<file path=ppt/slides/slide10.xml><?xml version="1.0" encoding="utf-8"?>
+<p:sld xmlns:a="http://schemas.openxmlformats.org/drawingml/2006/main" xmlns:r="http://schemas.openxmlformats.org/officeDocument/2006/relationships" xmlns:p="http://schemas.openxmlformats.org/presentationml/2006/main">
+  <p:cSld>
+    <p:spTree>
+      <p:nvGrpSpPr>
+        <p:cNvPr id="1" name=""/>
+        <p:cNvGrpSpPr/>
+        <p:nvPr/>
+      </p:nvGrpSpPr>
+      <p:grpSpPr>
+        <a:xfrm>
+          <a:off x="0" y="0"/>
+          <a:ext cx="0" cy="0"/>
+          <a:chOff x="0" y="0"/>
+          <a:chExt cx="0" cy="0"/>
+        </a:xfrm>
+      </p:grpSpPr>
+      <p:sp>
+        <p:nvSpPr>
+          <p:cNvPr id="2" name="Title 1"/>
+          <p:cNvSpPr>
+            <a:spLocks noGrp="1"/>
+          </p:cNvSpPr>
+          <p:nvPr>
+            <p:ph type="ctrTitle"/>
+          </p:nvPr>
+        </p:nvSpPr>
+        <p:spPr>
+          <a:xfrm>
+            <a:off x="1486422" y="0"/>
+            <a:ext cx="9144000" cy="1570733"/>
+          </a:xfrm>
+        </p:spPr>
+        <p:txBody>
+          <a:bodyPr>
+            <a:normAutofit/>
+          </a:bodyPr>
+          <a:lstStyle/>
+          <a:p>
+            <a:r>
+              <a:rPr lang="en-US" smtClean="0"/>
+              <a:t>Utilitarianism</a:t>
+            </a:r>
+            <a:endParaRPr lang="en-US" dirty="0"/>
+          </a:p>
+        </p:txBody>
+      </p:sp>
+      <p:sp>
+        <p:nvSpPr>
+          <p:cNvPr id="3" name="TextBox 2"/>
+          <p:cNvSpPr txBox="1"/>
+          <p:nvPr/>
+        </p:nvSpPr>
+        <p:spPr>
+          <a:xfrm>
+            <a:off x="877825" y="1871746"/>
+            <a:ext cx="10361193" cy="769441"/>
+          </a:xfrm>
+          <a:prstGeom prst="rect">
+            <a:avLst/>
+          </a:prstGeom>
+          <a:noFill/>
+        </p:spPr>
+        <p:txBody>
+          <a:bodyPr wrap="square" rtlCol="0">
+            <a:spAutoFit/>
+          </a:bodyPr>
+          <a:lstStyle/>
+          <a:p>
+            <a:pPr algn="ctr"/>
+            <a:r>
+              <a:rPr lang="en-US" sz="4400" dirty="0">
+                <a:latin typeface="+mj-lt"/>
+              </a:rPr>
+              <a:t>maximize net aggregate happiness</a:t>
+            </a:r>
+          </a:p>
+        </p:txBody>
+      </p:sp>
+      <p:sp>
+        <p:nvSpPr>
+          <p:cNvPr id="7" name="TextBox 6"/>
+          <p:cNvSpPr txBox="1"/>
+          <p:nvPr/>
+        </p:nvSpPr>
+        <p:spPr>
+          <a:xfrm>
+            <a:off x="970849" y="3176053"/>
+            <a:ext cx="10361193" cy="1446550"/>
+          </a:xfrm>
+          <a:prstGeom prst="rect">
+            <a:avLst/>
+          </a:prstGeom>
+          <a:noFill/>
+        </p:spPr>
+        <p:txBody>
+          <a:bodyPr wrap="square" rtlCol="0">
+            <a:spAutoFit/>
+          </a:bodyPr>
+          <a:lstStyle/>
+          <a:p>
+            <a:pPr algn="ctr"/>
+            <a:r>
+              <a:rPr lang="en-US" sz="4400" u="sng" dirty="0" smtClean="0">
+                <a:latin typeface="+mj-lt"/>
+              </a:rPr>
+              <a:t>happiness</a:t>
+            </a:r>
+            <a:r>
+              <a:rPr lang="en-US" sz="4400" dirty="0" smtClean="0">
+                <a:latin typeface="+mj-lt"/>
+              </a:rPr>
+              <a:t> or </a:t>
+            </a:r>
+            <a:r>
+              <a:rPr lang="en-US" sz="4400" u="sng" dirty="0" smtClean="0">
+                <a:latin typeface="+mj-lt"/>
+              </a:rPr>
+              <a:t>utility</a:t>
+            </a:r>
+            <a:r>
+              <a:rPr lang="en-US" sz="4400" dirty="0" smtClean="0">
+                <a:latin typeface="+mj-lt"/>
+              </a:rPr>
+              <a:t> is pleasure in the absence of pain</a:t>
+            </a:r>
+            <a:endParaRPr lang="en-US" sz="4400" dirty="0">
+              <a:latin typeface="+mj-lt"/>
+            </a:endParaRPr>
+          </a:p>
+        </p:txBody>
+      </p:sp>
+      <p:sp>
+        <p:nvSpPr>
+          <p:cNvPr id="8" name="TextBox 7"/>
+          <p:cNvSpPr txBox="1"/>
+          <p:nvPr/>
+        </p:nvSpPr>
+        <p:spPr>
+          <a:xfrm>
+            <a:off x="877825" y="4772748"/>
+            <a:ext cx="10361193" cy="769441"/>
+          </a:xfrm>
+          <a:prstGeom prst="rect">
+            <a:avLst/>
+          </a:prstGeom>
+          <a:noFill/>
+        </p:spPr>
+        <p:txBody>
+          <a:bodyPr wrap="square" rtlCol="0">
+            <a:spAutoFit/>
+          </a:bodyPr>
+          <a:lstStyle/>
+          <a:p>
+            <a:pPr algn="ctr"/>
+            <a:r>
+              <a:rPr lang="en-US" sz="4400" u="sng" dirty="0">
+                <a:latin typeface="+mj-lt"/>
+              </a:rPr>
+              <a:t>n</a:t>
+            </a:r>
+            <a:r>
+              <a:rPr lang="en-US" sz="4400" u="sng" dirty="0" smtClean="0">
+                <a:latin typeface="+mj-lt"/>
+              </a:rPr>
+              <a:t>et</a:t>
+            </a:r>
+            <a:r>
+              <a:rPr lang="en-US" sz="4400" dirty="0" smtClean="0">
+                <a:latin typeface="+mj-lt"/>
+              </a:rPr>
+              <a:t> means good minus bad</a:t>
+            </a:r>
+            <a:endParaRPr lang="en-US" sz="4400" dirty="0">
+              <a:latin typeface="+mj-lt"/>
+            </a:endParaRPr>
+          </a:p>
+        </p:txBody>
+      </p:sp>
+    </p:spTree>
+    <p:extLst>
+      <p:ext uri="{BB962C8B-B14F-4D97-AF65-F5344CB8AC3E}">
+        <p14:creationId xmlns:p14="http://schemas.microsoft.com/office/powerpoint/2010/main" val="144683171"/>
+      </p:ext>
+    </p:extLst>
+  </p:cSld>
+  <p:clrMapOvr>
+    <a:masterClrMapping/>
+  </p:clrMapOvr>
+  <mc:AlternateContent xmlns:mc="http://schemas.openxmlformats.org/markup-compatibility/2006" xmlns:p14="http://schemas.microsoft.com/office/powerpoint/2010/main">
+    <mc:Choice Requires="p14">
+      <p:transition spd="slow" p14:dur="2000" advTm="4104"/>
+    </mc:Choice>
+    <mc:Fallback xmlns="">
+      <p:transition spd="slow" advTm="4104"/>
+    </mc:Fallback>
+  </mc:AlternateContent>
+  <p:timing>
+    <p:tnLst>
+      <p:par>
+        <p:cTn id="1" dur="indefinite" restart="never" nodeType="tmRoot"/>
+      </p:par>
+    </p:tnLst>
+  </p:timing>
+</p:sld>
+</file>
+
+<file path=ppt/slides/slide11.xml><?xml version="1.0" encoding="utf-8"?>
+<p:sld xmlns:a="http://schemas.openxmlformats.org/drawingml/2006/main" xmlns:r="http://schemas.openxmlformats.org/officeDocument/2006/relationships" xmlns:p="http://schemas.openxmlformats.org/presentationml/2006/main">
+  <p:cSld>
+    <p:spTree>
+      <p:nvGrpSpPr>
+        <p:cNvPr id="1" name=""/>
+        <p:cNvGrpSpPr/>
+        <p:nvPr/>
+      </p:nvGrpSpPr>
+      <p:grpSpPr>
+        <a:xfrm>
+          <a:off x="0" y="0"/>
+          <a:ext cx="0" cy="0"/>
+          <a:chOff x="0" y="0"/>
+          <a:chExt cx="0" cy="0"/>
+        </a:xfrm>
+      </p:grpSpPr>
+      <p:sp>
+        <p:nvSpPr>
+          <p:cNvPr id="2" name="Title 1"/>
+          <p:cNvSpPr>
+            <a:spLocks noGrp="1"/>
+          </p:cNvSpPr>
+          <p:nvPr>
+            <p:ph type="ctrTitle"/>
+          </p:nvPr>
+        </p:nvSpPr>
+        <p:spPr>
+          <a:xfrm>
+            <a:off x="1486422" y="0"/>
+            <a:ext cx="9144000" cy="1570733"/>
+          </a:xfrm>
+        </p:spPr>
+        <p:txBody>
+          <a:bodyPr>
+            <a:normAutofit/>
+          </a:bodyPr>
+          <a:lstStyle/>
+          <a:p>
+            <a:r>
+              <a:rPr lang="en-US" smtClean="0"/>
+              <a:t>Utilitarianism</a:t>
+            </a:r>
+            <a:endParaRPr lang="en-US" dirty="0"/>
+          </a:p>
+        </p:txBody>
+      </p:sp>
+      <p:sp>
+        <p:nvSpPr>
+          <p:cNvPr id="3" name="TextBox 2"/>
+          <p:cNvSpPr txBox="1"/>
+          <p:nvPr/>
+        </p:nvSpPr>
+        <p:spPr>
+          <a:xfrm>
+            <a:off x="877825" y="1871746"/>
+            <a:ext cx="10361193" cy="769441"/>
+          </a:xfrm>
+          <a:prstGeom prst="rect">
+            <a:avLst/>
+          </a:prstGeom>
+          <a:noFill/>
+        </p:spPr>
+        <p:txBody>
+          <a:bodyPr wrap="square" rtlCol="0">
+            <a:spAutoFit/>
+          </a:bodyPr>
+          <a:lstStyle/>
+          <a:p>
+            <a:pPr algn="ctr"/>
+            <a:r>
+              <a:rPr lang="en-US" sz="4400" dirty="0">
+                <a:latin typeface="+mj-lt"/>
+              </a:rPr>
+              <a:t>maximize net aggregate happiness</a:t>
+            </a:r>
+          </a:p>
+        </p:txBody>
+      </p:sp>
+      <p:sp>
+        <p:nvSpPr>
+          <p:cNvPr id="7" name="TextBox 6"/>
+          <p:cNvSpPr txBox="1"/>
+          <p:nvPr/>
+        </p:nvSpPr>
+        <p:spPr>
+          <a:xfrm>
+            <a:off x="970849" y="3176053"/>
+            <a:ext cx="10361193" cy="1446550"/>
+          </a:xfrm>
+          <a:prstGeom prst="rect">
+            <a:avLst/>
+          </a:prstGeom>
+          <a:noFill/>
+        </p:spPr>
+        <p:txBody>
+          <a:bodyPr wrap="square" rtlCol="0">
+            <a:spAutoFit/>
+          </a:bodyPr>
+          <a:lstStyle/>
+          <a:p>
+            <a:pPr algn="ctr"/>
+            <a:r>
+              <a:rPr lang="en-US" sz="4400" u="sng" dirty="0" smtClean="0">
+                <a:latin typeface="+mj-lt"/>
+              </a:rPr>
+              <a:t>happiness</a:t>
+            </a:r>
+            <a:r>
+              <a:rPr lang="en-US" sz="4400" dirty="0" smtClean="0">
+                <a:latin typeface="+mj-lt"/>
+              </a:rPr>
+              <a:t> or </a:t>
+            </a:r>
+            <a:r>
+              <a:rPr lang="en-US" sz="4400" u="sng" dirty="0" smtClean="0">
+                <a:latin typeface="+mj-lt"/>
+              </a:rPr>
+              <a:t>utility</a:t>
+            </a:r>
+            <a:r>
+              <a:rPr lang="en-US" sz="4400" dirty="0" smtClean="0">
+                <a:latin typeface="+mj-lt"/>
+              </a:rPr>
+              <a:t> is pleasure in the absence of pain</a:t>
+            </a:r>
+            <a:endParaRPr lang="en-US" sz="4400" dirty="0">
+              <a:latin typeface="+mj-lt"/>
+            </a:endParaRPr>
+          </a:p>
+        </p:txBody>
+      </p:sp>
+      <p:sp>
+        <p:nvSpPr>
+          <p:cNvPr id="8" name="TextBox 7"/>
+          <p:cNvSpPr txBox="1"/>
+          <p:nvPr/>
+        </p:nvSpPr>
+        <p:spPr>
+          <a:xfrm>
+            <a:off x="877825" y="4772748"/>
+            <a:ext cx="10361193" cy="769441"/>
+          </a:xfrm>
+          <a:prstGeom prst="rect">
+            <a:avLst/>
+          </a:prstGeom>
+          <a:noFill/>
+        </p:spPr>
+        <p:txBody>
+          <a:bodyPr wrap="square" rtlCol="0">
+            <a:spAutoFit/>
+          </a:bodyPr>
+          <a:lstStyle/>
+          <a:p>
+            <a:pPr algn="ctr"/>
+            <a:r>
+              <a:rPr lang="en-US" sz="4400" u="sng" dirty="0">
+                <a:latin typeface="+mj-lt"/>
+              </a:rPr>
+              <a:t>n</a:t>
+            </a:r>
+            <a:r>
+              <a:rPr lang="en-US" sz="4400" u="sng" dirty="0" smtClean="0">
+                <a:latin typeface="+mj-lt"/>
+              </a:rPr>
+              <a:t>et</a:t>
+            </a:r>
+            <a:r>
+              <a:rPr lang="en-US" sz="4400" dirty="0" smtClean="0">
+                <a:latin typeface="+mj-lt"/>
+              </a:rPr>
+              <a:t> means good minus bad</a:t>
+            </a:r>
+            <a:endParaRPr lang="en-US" sz="4400" dirty="0">
+              <a:latin typeface="+mj-lt"/>
+            </a:endParaRPr>
+          </a:p>
+        </p:txBody>
+      </p:sp>
+      <p:sp>
+        <p:nvSpPr>
+          <p:cNvPr id="9" name="TextBox 8"/>
+          <p:cNvSpPr txBox="1"/>
+          <p:nvPr/>
+        </p:nvSpPr>
+        <p:spPr>
+          <a:xfrm>
+            <a:off x="877825" y="5542189"/>
+            <a:ext cx="10361193" cy="769441"/>
+          </a:xfrm>
+          <a:prstGeom prst="rect">
+            <a:avLst/>
+          </a:prstGeom>
+          <a:noFill/>
+        </p:spPr>
+        <p:txBody>
+          <a:bodyPr wrap="square" rtlCol="0">
+            <a:spAutoFit/>
+          </a:bodyPr>
+          <a:lstStyle/>
+          <a:p>
+            <a:pPr algn="ctr"/>
+            <a:r>
+              <a:rPr lang="en-US" sz="4400" u="sng" dirty="0" smtClean="0">
+                <a:latin typeface="+mj-lt"/>
+              </a:rPr>
+              <a:t>aggregate</a:t>
+            </a:r>
+            <a:r>
+              <a:rPr lang="en-US" sz="4400" dirty="0" smtClean="0">
+                <a:latin typeface="+mj-lt"/>
+              </a:rPr>
+              <a:t> means sum for all individuals</a:t>
+            </a:r>
+            <a:endParaRPr lang="en-US" sz="4400" dirty="0">
+              <a:latin typeface="+mj-lt"/>
+            </a:endParaRPr>
+          </a:p>
+        </p:txBody>
+      </p:sp>
+    </p:spTree>
+    <p:extLst>
+      <p:ext uri="{BB962C8B-B14F-4D97-AF65-F5344CB8AC3E}">
+        <p14:creationId xmlns:p14="http://schemas.microsoft.com/office/powerpoint/2010/main" val="683227688"/>
+      </p:ext>
+    </p:extLst>
+  </p:cSld>
+  <p:clrMapOvr>
+    <a:masterClrMapping/>
+  </p:clrMapOvr>
+  <mc:AlternateContent xmlns:mc="http://schemas.openxmlformats.org/markup-compatibility/2006" xmlns:p14="http://schemas.microsoft.com/office/powerpoint/2010/main">
+    <mc:Choice Requires="p14">
+      <p:transition spd="slow" p14:dur="2000" advTm="4104"/>
+    </mc:Choice>
+    <mc:Fallback xmlns="">
+      <p:transition spd="slow" advTm="4104"/>
+    </mc:Fallback>
+  </mc:AlternateContent>
+  <p:timing>
+    <p:tnLst>
+      <p:par>
+        <p:cTn id="1" dur="indefinite" restart="never" nodeType="tmRoot"/>
+      </p:par>
+    </p:tnLst>
+  </p:timing>
+</p:sld>
+</file>
+
+<file path=ppt/slides/slide12.xml><?xml version="1.0" encoding="utf-8"?>
+<p:sld xmlns:a="http://schemas.openxmlformats.org/drawingml/2006/main" xmlns:r="http://schemas.openxmlformats.org/officeDocument/2006/relationships" xmlns:p="http://schemas.openxmlformats.org/presentationml/2006/main">
+  <p:cSld>
+    <p:spTree>
+      <p:nvGrpSpPr>
+        <p:cNvPr id="1" name=""/>
+        <p:cNvGrpSpPr/>
+        <p:nvPr/>
+      </p:nvGrpSpPr>
+      <p:grpSpPr>
+        <a:xfrm>
+          <a:off x="0" y="0"/>
+          <a:ext cx="0" cy="0"/>
+          <a:chOff x="0" y="0"/>
+          <a:chExt cx="0" cy="0"/>
+        </a:xfrm>
+      </p:grpSpPr>
+      <p:sp>
+        <p:nvSpPr>
+          <p:cNvPr id="5" name="TextBox 4"/>
+          <p:cNvSpPr txBox="1"/>
+          <p:nvPr/>
+        </p:nvSpPr>
+        <p:spPr>
+          <a:xfrm>
+            <a:off x="2871876" y="1873699"/>
+            <a:ext cx="5875583" cy="923330"/>
+          </a:xfrm>
+          <a:prstGeom prst="rect">
+            <a:avLst/>
+          </a:prstGeom>
+          <a:noFill/>
+        </p:spPr>
+        <p:txBody>
+          <a:bodyPr wrap="none" rtlCol="0">
+            <a:spAutoFit/>
+          </a:bodyPr>
+          <a:lstStyle/>
+          <a:p>
+            <a:r>
+              <a:rPr lang="en-US" sz="5400" smtClean="0">
+                <a:latin typeface="+mj-lt"/>
+              </a:rPr>
+              <a:t>2. </a:t>
+            </a:r>
+            <a:r>
+              <a:rPr lang="en-US" sz="5400" dirty="0" smtClean="0">
+                <a:latin typeface="+mj-lt"/>
+              </a:rPr>
+              <a:t>Deontology </a:t>
+            </a:r>
+            <a:r>
+              <a:rPr lang="en-US" sz="5400" dirty="0">
+                <a:latin typeface="+mj-lt"/>
+              </a:rPr>
+              <a:t>(Kant</a:t>
+            </a:r>
+            <a:r>
+              <a:rPr lang="en-US" sz="5400" dirty="0" smtClean="0">
+                <a:latin typeface="+mj-lt"/>
+              </a:rPr>
+              <a:t>)</a:t>
+            </a:r>
+          </a:p>
+        </p:txBody>
+      </p:sp>
+    </p:spTree>
+    <p:extLst>
+      <p:ext uri="{BB962C8B-B14F-4D97-AF65-F5344CB8AC3E}">
+        <p14:creationId xmlns:p14="http://schemas.microsoft.com/office/powerpoint/2010/main" val="327778704"/>
+      </p:ext>
+    </p:extLst>
+  </p:cSld>
+  <p:clrMapOvr>
+    <a:masterClrMapping/>
+  </p:clrMapOvr>
+  <mc:AlternateContent xmlns:mc="http://schemas.openxmlformats.org/markup-compatibility/2006" xmlns:p14="http://schemas.microsoft.com/office/powerpoint/2010/main">
+    <mc:Choice Requires="p14">
+      <p:transition spd="slow" p14:dur="2000" advTm="7988"/>
+    </mc:Choice>
+    <mc:Fallback xmlns="">
+      <p:transition spd="slow" advTm="7988"/>
+    </mc:Fallback>
+  </mc:AlternateContent>
+  <p:timing>
+    <p:tnLst>
+      <p:par>
+        <p:cTn id="1" dur="indefinite" restart="never" nodeType="tmRoot"/>
+      </p:par>
+    </p:tnLst>
+  </p:timing>
+</p:sld>
+</file>
+
+<file path=ppt/slides/slide13.xml><?xml version="1.0" encoding="utf-8"?>
+<p:sld xmlns:a="http://schemas.openxmlformats.org/drawingml/2006/main" xmlns:r="http://schemas.openxmlformats.org/officeDocument/2006/relationships" xmlns:p="http://schemas.openxmlformats.org/presentationml/2006/main">
+  <p:cSld>
+    <p:spTree>
+      <p:nvGrpSpPr>
+        <p:cNvPr id="1" name=""/>
+        <p:cNvGrpSpPr/>
+        <p:nvPr/>
+      </p:nvGrpSpPr>
+      <p:grpSpPr>
+        <a:xfrm>
+          <a:off x="0" y="0"/>
+          <a:ext cx="0" cy="0"/>
+          <a:chOff x="0" y="0"/>
+          <a:chExt cx="0" cy="0"/>
+        </a:xfrm>
+      </p:grpSpPr>
+      <p:sp>
+        <p:nvSpPr>
+          <p:cNvPr id="5" name="TextBox 4"/>
+          <p:cNvSpPr txBox="1"/>
+          <p:nvPr/>
+        </p:nvSpPr>
+        <p:spPr>
+          <a:xfrm>
+            <a:off x="959948" y="175527"/>
+            <a:ext cx="10318594" cy="923330"/>
+          </a:xfrm>
+          <a:prstGeom prst="rect">
+            <a:avLst/>
+          </a:prstGeom>
+          <a:noFill/>
+        </p:spPr>
+        <p:txBody>
+          <a:bodyPr wrap="none" rtlCol="0">
+            <a:spAutoFit/>
+          </a:bodyPr>
+          <a:lstStyle/>
+          <a:p>
+            <a:r>
+              <a:rPr lang="en-US" sz="5400" dirty="0" smtClean="0">
+                <a:latin typeface="+mj-lt"/>
+              </a:rPr>
+              <a:t>Kant</a:t>
+            </a:r>
+            <a:r>
+              <a:rPr lang="en-US" sz="5400" dirty="0">
+                <a:latin typeface="+mj-lt"/>
+              </a:rPr>
+              <a:t> </a:t>
+            </a:r>
+            <a:r>
+              <a:rPr lang="en-US" sz="5400" dirty="0" smtClean="0">
+                <a:latin typeface="+mj-lt"/>
+              </a:rPr>
+              <a:t>has two </a:t>
+            </a:r>
+            <a:r>
+              <a:rPr lang="en-US" sz="5400" u="sng" dirty="0" smtClean="0">
+                <a:latin typeface="+mj-lt"/>
+              </a:rPr>
+              <a:t>categorical imperatives</a:t>
+            </a:r>
+            <a:endParaRPr lang="en-US" sz="5400" dirty="0" smtClean="0">
+              <a:latin typeface="+mj-lt"/>
+            </a:endParaRPr>
+          </a:p>
+        </p:txBody>
+      </p:sp>
+    </p:spTree>
+    <p:extLst>
+      <p:ext uri="{BB962C8B-B14F-4D97-AF65-F5344CB8AC3E}">
+        <p14:creationId xmlns:p14="http://schemas.microsoft.com/office/powerpoint/2010/main" val="1694549136"/>
+      </p:ext>
+    </p:extLst>
+  </p:cSld>
+  <p:clrMapOvr>
+    <a:masterClrMapping/>
+  </p:clrMapOvr>
+  <mc:AlternateContent xmlns:mc="http://schemas.openxmlformats.org/markup-compatibility/2006" xmlns:p14="http://schemas.microsoft.com/office/powerpoint/2010/main">
+    <mc:Choice Requires="p14">
+      <p:transition spd="slow" p14:dur="2000" advTm="7988"/>
+    </mc:Choice>
+    <mc:Fallback xmlns="">
+      <p:transition spd="slow" advTm="7988"/>
+    </mc:Fallback>
+  </mc:AlternateContent>
+  <p:timing>
+    <p:tnLst>
+      <p:par>
+        <p:cTn id="1" dur="indefinite" restart="never" nodeType="tmRoot"/>
+      </p:par>
+    </p:tnLst>
+  </p:timing>
+</p:sld>
+</file>
+
+<file path=ppt/slides/slide14.xml><?xml version="1.0" encoding="utf-8"?>
+<p:sld xmlns:a="http://schemas.openxmlformats.org/drawingml/2006/main" xmlns:r="http://schemas.openxmlformats.org/officeDocument/2006/relationships" xmlns:p="http://schemas.openxmlformats.org/presentationml/2006/main">
+  <p:cSld>
+    <p:spTree>
+      <p:nvGrpSpPr>
+        <p:cNvPr id="1" name=""/>
+        <p:cNvGrpSpPr/>
+        <p:nvPr/>
+      </p:nvGrpSpPr>
+      <p:grpSpPr>
+        <a:xfrm>
+          <a:off x="0" y="0"/>
+          <a:ext cx="0" cy="0"/>
+          <a:chOff x="0" y="0"/>
+          <a:chExt cx="0" cy="0"/>
+        </a:xfrm>
+      </p:grpSpPr>
+      <p:sp>
+        <p:nvSpPr>
+          <p:cNvPr id="5" name="TextBox 4"/>
+          <p:cNvSpPr txBox="1"/>
+          <p:nvPr/>
+        </p:nvSpPr>
+        <p:spPr>
+          <a:xfrm>
+            <a:off x="959948" y="175527"/>
+            <a:ext cx="10318594" cy="923330"/>
+          </a:xfrm>
+          <a:prstGeom prst="rect">
+            <a:avLst/>
+          </a:prstGeom>
+          <a:noFill/>
+        </p:spPr>
+        <p:txBody>
+          <a:bodyPr wrap="none" rtlCol="0">
+            <a:spAutoFit/>
+          </a:bodyPr>
+          <a:lstStyle/>
+          <a:p>
+            <a:r>
+              <a:rPr lang="en-US" sz="5400" dirty="0" smtClean="0">
+                <a:latin typeface="+mj-lt"/>
+              </a:rPr>
+              <a:t>Kant</a:t>
+            </a:r>
+            <a:r>
+              <a:rPr lang="en-US" sz="5400" dirty="0">
+                <a:latin typeface="+mj-lt"/>
+              </a:rPr>
+              <a:t> </a:t>
+            </a:r>
+            <a:r>
+              <a:rPr lang="en-US" sz="5400" dirty="0" smtClean="0">
+                <a:latin typeface="+mj-lt"/>
+              </a:rPr>
+              <a:t>has two </a:t>
+            </a:r>
+            <a:r>
+              <a:rPr lang="en-US" sz="5400" u="sng" dirty="0" smtClean="0">
+                <a:latin typeface="+mj-lt"/>
+              </a:rPr>
+              <a:t>categorical imperatives</a:t>
+            </a:r>
+            <a:endParaRPr lang="en-US" sz="5400" dirty="0" smtClean="0">
+              <a:latin typeface="+mj-lt"/>
+            </a:endParaRPr>
+          </a:p>
+        </p:txBody>
+      </p:sp>
+      <p:sp>
+        <p:nvSpPr>
+          <p:cNvPr id="4" name="TextBox 3"/>
+          <p:cNvSpPr txBox="1"/>
+          <p:nvPr/>
+        </p:nvSpPr>
+        <p:spPr>
+          <a:xfrm>
+            <a:off x="557192" y="1527361"/>
+            <a:ext cx="10361193" cy="1446550"/>
+          </a:xfrm>
+          <a:prstGeom prst="rect">
+            <a:avLst/>
+          </a:prstGeom>
+          <a:noFill/>
+        </p:spPr>
+        <p:txBody>
+          <a:bodyPr wrap="square" rtlCol="0">
+            <a:spAutoFit/>
+          </a:bodyPr>
+          <a:lstStyle/>
+          <a:p>
+            <a:pPr algn="ctr"/>
+            <a:r>
+              <a:rPr lang="en-US" sz="4400" dirty="0" smtClean="0">
+                <a:latin typeface="+mj-lt"/>
+              </a:rPr>
+              <a:t>1. Act only on that maxim which you can at the same time will become universal law</a:t>
+            </a:r>
+            <a:endParaRPr lang="en-US" sz="4400" dirty="0">
+              <a:latin typeface="+mj-lt"/>
+            </a:endParaRPr>
+          </a:p>
+        </p:txBody>
+      </p:sp>
+    </p:spTree>
+    <p:extLst>
+      <p:ext uri="{BB962C8B-B14F-4D97-AF65-F5344CB8AC3E}">
+        <p14:creationId xmlns:p14="http://schemas.microsoft.com/office/powerpoint/2010/main" val="1608921208"/>
+      </p:ext>
+    </p:extLst>
+  </p:cSld>
+  <p:clrMapOvr>
+    <a:masterClrMapping/>
+  </p:clrMapOvr>
+  <mc:AlternateContent xmlns:mc="http://schemas.openxmlformats.org/markup-compatibility/2006" xmlns:p14="http://schemas.microsoft.com/office/powerpoint/2010/main">
+    <mc:Choice Requires="p14">
+      <p:transition spd="slow" p14:dur="2000" advTm="7988"/>
+    </mc:Choice>
+    <mc:Fallback xmlns="">
+      <p:transition spd="slow" advTm="7988"/>
+    </mc:Fallback>
+  </mc:AlternateContent>
+  <p:timing>
+    <p:tnLst>
+      <p:par>
+        <p:cTn id="1" dur="indefinite" restart="never" nodeType="tmRoot"/>
+      </p:par>
+    </p:tnLst>
+  </p:timing>
+</p:sld>
+</file>
+
+<file path=ppt/slides/slide15.xml><?xml version="1.0" encoding="utf-8"?>
+<p:sld xmlns:a="http://schemas.openxmlformats.org/drawingml/2006/main" xmlns:r="http://schemas.openxmlformats.org/officeDocument/2006/relationships" xmlns:p="http://schemas.openxmlformats.org/presentationml/2006/main">
+  <p:cSld>
+    <p:spTree>
+      <p:nvGrpSpPr>
+        <p:cNvPr id="1" name=""/>
+        <p:cNvGrpSpPr/>
+        <p:nvPr/>
+      </p:nvGrpSpPr>
+      <p:grpSpPr>
+        <a:xfrm>
+          <a:off x="0" y="0"/>
+          <a:ext cx="0" cy="0"/>
+          <a:chOff x="0" y="0"/>
+          <a:chExt cx="0" cy="0"/>
+        </a:xfrm>
+      </p:grpSpPr>
+      <p:sp>
+        <p:nvSpPr>
+          <p:cNvPr id="5" name="TextBox 4"/>
+          <p:cNvSpPr txBox="1"/>
+          <p:nvPr/>
+        </p:nvSpPr>
+        <p:spPr>
+          <a:xfrm>
+            <a:off x="959948" y="175527"/>
+            <a:ext cx="10318594" cy="923330"/>
+          </a:xfrm>
+          <a:prstGeom prst="rect">
+            <a:avLst/>
+          </a:prstGeom>
+          <a:noFill/>
+        </p:spPr>
+        <p:txBody>
+          <a:bodyPr wrap="none" rtlCol="0">
+            <a:spAutoFit/>
+          </a:bodyPr>
+          <a:lstStyle/>
+          <a:p>
+            <a:r>
+              <a:rPr lang="en-US" sz="5400" dirty="0" smtClean="0">
+                <a:latin typeface="+mj-lt"/>
+              </a:rPr>
+              <a:t>Kant</a:t>
+            </a:r>
+            <a:r>
+              <a:rPr lang="en-US" sz="5400" dirty="0">
+                <a:latin typeface="+mj-lt"/>
+              </a:rPr>
+              <a:t> </a:t>
+            </a:r>
+            <a:r>
+              <a:rPr lang="en-US" sz="5400" dirty="0" smtClean="0">
+                <a:latin typeface="+mj-lt"/>
+              </a:rPr>
+              <a:t>has two </a:t>
+            </a:r>
+            <a:r>
+              <a:rPr lang="en-US" sz="5400" u="sng" dirty="0" smtClean="0">
+                <a:latin typeface="+mj-lt"/>
+              </a:rPr>
+              <a:t>categorical imperatives</a:t>
+            </a:r>
+            <a:endParaRPr lang="en-US" sz="5400" dirty="0" smtClean="0">
+              <a:latin typeface="+mj-lt"/>
+            </a:endParaRPr>
+          </a:p>
+        </p:txBody>
+      </p:sp>
+      <p:sp>
+        <p:nvSpPr>
+          <p:cNvPr id="4" name="TextBox 3"/>
+          <p:cNvSpPr txBox="1"/>
+          <p:nvPr/>
+        </p:nvSpPr>
+        <p:spPr>
+          <a:xfrm>
+            <a:off x="557192" y="1527361"/>
+            <a:ext cx="10361193" cy="1446550"/>
+          </a:xfrm>
+          <a:prstGeom prst="rect">
+            <a:avLst/>
+          </a:prstGeom>
+          <a:noFill/>
+        </p:spPr>
+        <p:txBody>
+          <a:bodyPr wrap="square" rtlCol="0">
+            <a:spAutoFit/>
+          </a:bodyPr>
+          <a:lstStyle/>
+          <a:p>
+            <a:pPr algn="ctr"/>
+            <a:r>
+              <a:rPr lang="en-US" sz="4400" dirty="0" smtClean="0">
+                <a:latin typeface="+mj-lt"/>
+              </a:rPr>
+              <a:t>1. Act only on that maxim which you can at the same time will become universal law</a:t>
+            </a:r>
+            <a:endParaRPr lang="en-US" sz="4400" dirty="0">
+              <a:latin typeface="+mj-lt"/>
+            </a:endParaRPr>
+          </a:p>
+        </p:txBody>
+      </p:sp>
+      <p:sp>
+        <p:nvSpPr>
+          <p:cNvPr id="6" name="TextBox 5"/>
+          <p:cNvSpPr txBox="1"/>
+          <p:nvPr/>
+        </p:nvSpPr>
+        <p:spPr>
+          <a:xfrm>
+            <a:off x="709592" y="3508561"/>
+            <a:ext cx="10361193" cy="2123658"/>
+          </a:xfrm>
+          <a:prstGeom prst="rect">
+            <a:avLst/>
+          </a:prstGeom>
+          <a:noFill/>
+        </p:spPr>
+        <p:txBody>
+          <a:bodyPr wrap="square" rtlCol="0">
+            <a:spAutoFit/>
+          </a:bodyPr>
+          <a:lstStyle/>
+          <a:p>
+            <a:pPr algn="ctr"/>
+            <a:r>
+              <a:rPr lang="en-US" sz="4400" dirty="0">
+                <a:latin typeface="+mj-lt"/>
+              </a:rPr>
+              <a:t>2</a:t>
+            </a:r>
+            <a:r>
+              <a:rPr lang="en-US" sz="4400" dirty="0" smtClean="0">
+                <a:latin typeface="+mj-lt"/>
+              </a:rPr>
+              <a:t>. Always treat humanity, whether yourself or others, as an end and never as a mere means</a:t>
+            </a:r>
+            <a:endParaRPr lang="en-US" sz="4400" dirty="0">
+              <a:latin typeface="+mj-lt"/>
+            </a:endParaRPr>
+          </a:p>
+        </p:txBody>
+      </p:sp>
+    </p:spTree>
+    <p:extLst>
+      <p:ext uri="{BB962C8B-B14F-4D97-AF65-F5344CB8AC3E}">
+        <p14:creationId xmlns:p14="http://schemas.microsoft.com/office/powerpoint/2010/main" val="24659832"/>
+      </p:ext>
+    </p:extLst>
+  </p:cSld>
+  <p:clrMapOvr>
+    <a:masterClrMapping/>
+  </p:clrMapOvr>
+  <mc:AlternateContent xmlns:mc="http://schemas.openxmlformats.org/markup-compatibility/2006" xmlns:p14="http://schemas.microsoft.com/office/powerpoint/2010/main">
+    <mc:Choice Requires="p14">
+      <p:transition spd="slow" p14:dur="2000" advTm="7988"/>
+    </mc:Choice>
+    <mc:Fallback xmlns="">
+      <p:transition spd="slow" advTm="7988"/>
+    </mc:Fallback>
+  </mc:AlternateContent>
+  <p:timing>
+    <p:tnLst>
+      <p:par>
+        <p:cTn id="1" dur="indefinite" restart="never" nodeType="tmRoot"/>
+      </p:par>
+    </p:tnLst>
+  </p:timing>
+</p:sld>
+</file>
+
+<file path=ppt/slides/slide16.xml><?xml version="1.0" encoding="utf-8"?>
+<p:sld xmlns:a="http://schemas.openxmlformats.org/drawingml/2006/main" xmlns:r="http://schemas.openxmlformats.org/officeDocument/2006/relationships" xmlns:p="http://schemas.openxmlformats.org/presentationml/2006/main">
+  <p:cSld>
+    <p:spTree>
+      <p:nvGrpSpPr>
+        <p:cNvPr id="1" name=""/>
+        <p:cNvGrpSpPr/>
+        <p:nvPr/>
+      </p:nvGrpSpPr>
+      <p:grpSpPr>
+        <a:xfrm>
+          <a:off x="0" y="0"/>
+          <a:ext cx="0" cy="0"/>
+          <a:chOff x="0" y="0"/>
+          <a:chExt cx="0" cy="0"/>
+        </a:xfrm>
+      </p:grpSpPr>
+      <p:sp>
+        <p:nvSpPr>
+          <p:cNvPr id="5" name="TextBox 4"/>
+          <p:cNvSpPr txBox="1"/>
+          <p:nvPr/>
+        </p:nvSpPr>
+        <p:spPr>
+          <a:xfrm>
+            <a:off x="2271801" y="1559374"/>
+            <a:ext cx="7497630" cy="923330"/>
+          </a:xfrm>
+          <a:prstGeom prst="rect">
+            <a:avLst/>
+          </a:prstGeom>
+          <a:noFill/>
+        </p:spPr>
+        <p:txBody>
+          <a:bodyPr wrap="none" rtlCol="0">
+            <a:spAutoFit/>
+          </a:bodyPr>
+          <a:lstStyle/>
+          <a:p>
+            <a:r>
+              <a:rPr lang="en-US" sz="5400" dirty="0" smtClean="0">
+                <a:latin typeface="+mj-lt"/>
+              </a:rPr>
+              <a:t>3. Virtue Ethics (</a:t>
+            </a:r>
+            <a:r>
+              <a:rPr lang="en-US" sz="5400" dirty="0" err="1" smtClean="0">
+                <a:latin typeface="+mj-lt"/>
+              </a:rPr>
+              <a:t>Artistotle</a:t>
+            </a:r>
+            <a:r>
+              <a:rPr lang="en-US" sz="5400" dirty="0" smtClean="0">
+                <a:latin typeface="+mj-lt"/>
+              </a:rPr>
+              <a:t>)</a:t>
+            </a:r>
+          </a:p>
+        </p:txBody>
+      </p:sp>
+    </p:spTree>
+    <p:extLst>
+      <p:ext uri="{BB962C8B-B14F-4D97-AF65-F5344CB8AC3E}">
+        <p14:creationId xmlns:p14="http://schemas.microsoft.com/office/powerpoint/2010/main" val="1223396110"/>
+      </p:ext>
+    </p:extLst>
+  </p:cSld>
+  <p:clrMapOvr>
+    <a:masterClrMapping/>
+  </p:clrMapOvr>
+  <mc:AlternateContent xmlns:mc="http://schemas.openxmlformats.org/markup-compatibility/2006" xmlns:p14="http://schemas.microsoft.com/office/powerpoint/2010/main">
+    <mc:Choice Requires="p14">
+      <p:transition spd="slow" p14:dur="2000" advTm="7988"/>
+    </mc:Choice>
+    <mc:Fallback xmlns="">
+      <p:transition spd="slow" advTm="7988"/>
+    </mc:Fallback>
+  </mc:AlternateContent>
+  <p:timing>
+    <p:tnLst>
+      <p:par>
+        <p:cTn id="1" dur="indefinite" restart="never" nodeType="tmRoot"/>
+      </p:par>
+    </p:tnLst>
+  </p:timing>
+</p:sld>
+</file>
+
+<file path=ppt/slides/slide17.xml><?xml version="1.0" encoding="utf-8"?>
+<p:sld xmlns:a="http://schemas.openxmlformats.org/drawingml/2006/main" xmlns:r="http://schemas.openxmlformats.org/officeDocument/2006/relationships" xmlns:p="http://schemas.openxmlformats.org/presentationml/2006/main">
+  <p:cSld>
+    <p:spTree>
+      <p:nvGrpSpPr>
+        <p:cNvPr id="1" name=""/>
+        <p:cNvGrpSpPr/>
+        <p:nvPr/>
+      </p:nvGrpSpPr>
+      <p:grpSpPr>
+        <a:xfrm>
+          <a:off x="0" y="0"/>
+          <a:ext cx="0" cy="0"/>
+          <a:chOff x="0" y="0"/>
+          <a:chExt cx="0" cy="0"/>
+        </a:xfrm>
+      </p:grpSpPr>
+      <p:sp>
+        <p:nvSpPr>
+          <p:cNvPr id="2" name="Rectangle 1"/>
+          <p:cNvSpPr/>
+          <p:nvPr/>
+        </p:nvSpPr>
+        <p:spPr>
+          <a:xfrm>
+            <a:off x="3372152" y="2834728"/>
+            <a:ext cx="3882666" cy="3416320"/>
+          </a:xfrm>
+          <a:prstGeom prst="rect">
+            <a:avLst/>
+          </a:prstGeom>
+        </p:spPr>
+        <p:txBody>
+          <a:bodyPr wrap="none">
+            <a:spAutoFit/>
+          </a:bodyPr>
+          <a:lstStyle/>
+          <a:p>
+            <a:pPr marL="285750" indent="-285750">
+              <a:buFont typeface="Arial" charset="0"/>
+              <a:buChar char="•"/>
+            </a:pPr>
+            <a:r>
+              <a:rPr lang="en-US" sz="5400" dirty="0" smtClean="0">
+                <a:latin typeface="+mj-lt"/>
+              </a:rPr>
+              <a:t>Temperance</a:t>
+            </a:r>
+          </a:p>
+          <a:p>
+            <a:pPr marL="285750" indent="-285750">
+              <a:buFont typeface="Arial" charset="0"/>
+              <a:buChar char="•"/>
+            </a:pPr>
+            <a:r>
+              <a:rPr lang="en-US" sz="5400" dirty="0" smtClean="0">
+                <a:latin typeface="+mj-lt"/>
+              </a:rPr>
+              <a:t>Wisdom</a:t>
+            </a:r>
+          </a:p>
+          <a:p>
+            <a:pPr marL="285750" indent="-285750">
+              <a:buFont typeface="Arial" charset="0"/>
+              <a:buChar char="•"/>
+            </a:pPr>
+            <a:r>
+              <a:rPr lang="en-US" sz="5400" dirty="0" smtClean="0">
+                <a:latin typeface="+mj-lt"/>
+              </a:rPr>
+              <a:t>Justice</a:t>
+            </a:r>
+          </a:p>
+          <a:p>
+            <a:pPr marL="285750" indent="-285750">
+              <a:buFont typeface="Arial" charset="0"/>
+              <a:buChar char="•"/>
+            </a:pPr>
+            <a:r>
+              <a:rPr lang="en-US" sz="5400" dirty="0">
+                <a:latin typeface="+mj-lt"/>
+              </a:rPr>
+              <a:t>C</a:t>
+            </a:r>
+            <a:r>
+              <a:rPr lang="en-US" sz="5400" dirty="0" smtClean="0">
+                <a:latin typeface="+mj-lt"/>
+              </a:rPr>
+              <a:t>ourage</a:t>
+            </a:r>
+            <a:endParaRPr lang="en-US" sz="5400" dirty="0">
+              <a:latin typeface="+mj-lt"/>
+            </a:endParaRPr>
+          </a:p>
+        </p:txBody>
+      </p:sp>
+      <p:sp>
+        <p:nvSpPr>
+          <p:cNvPr id="7" name="Rectangle 6"/>
+          <p:cNvSpPr/>
+          <p:nvPr/>
+        </p:nvSpPr>
+        <p:spPr>
+          <a:xfrm>
+            <a:off x="385763" y="2146040"/>
+            <a:ext cx="10542561" cy="923330"/>
+          </a:xfrm>
+          <a:prstGeom prst="rect">
+            <a:avLst/>
+          </a:prstGeom>
+        </p:spPr>
+        <p:txBody>
+          <a:bodyPr wrap="square">
+            <a:spAutoFit/>
+          </a:bodyPr>
+          <a:lstStyle/>
+          <a:p>
+            <a:r>
+              <a:rPr lang="en-US" sz="5400" dirty="0" smtClean="0">
+                <a:latin typeface="+mj-lt"/>
+              </a:rPr>
+              <a:t>Aristotle’s four cardinal </a:t>
+            </a:r>
+            <a:r>
+              <a:rPr lang="en-US" sz="5400" dirty="0">
+                <a:latin typeface="+mj-lt"/>
+              </a:rPr>
+              <a:t>v</a:t>
+            </a:r>
+            <a:r>
+              <a:rPr lang="en-US" sz="5400" dirty="0" smtClean="0">
+                <a:latin typeface="+mj-lt"/>
+              </a:rPr>
+              <a:t>irtues:</a:t>
+            </a:r>
+            <a:endParaRPr lang="en-US" sz="5400" dirty="0">
+              <a:latin typeface="+mj-lt"/>
+            </a:endParaRPr>
+          </a:p>
+        </p:txBody>
+      </p:sp>
+      <p:sp>
+        <p:nvSpPr>
+          <p:cNvPr id="8" name="TextBox 7"/>
+          <p:cNvSpPr txBox="1"/>
+          <p:nvPr/>
+        </p:nvSpPr>
+        <p:spPr>
+          <a:xfrm>
+            <a:off x="57150" y="185052"/>
+            <a:ext cx="12192000" cy="923330"/>
+          </a:xfrm>
+          <a:prstGeom prst="rect">
+            <a:avLst/>
+          </a:prstGeom>
+          <a:noFill/>
+        </p:spPr>
+        <p:txBody>
+          <a:bodyPr wrap="square" rtlCol="0">
+            <a:spAutoFit/>
+          </a:bodyPr>
+          <a:lstStyle/>
+          <a:p>
+            <a:pPr algn="ctr"/>
+            <a:r>
+              <a:rPr lang="en-US" sz="5400" dirty="0" smtClean="0">
+                <a:latin typeface="+mj-lt"/>
+              </a:rPr>
+              <a:t>Virtue Ethics</a:t>
+            </a:r>
+            <a:endParaRPr lang="en-US" sz="5400" u="sng" dirty="0" smtClean="0">
+              <a:latin typeface="+mj-lt"/>
+            </a:endParaRPr>
+          </a:p>
+        </p:txBody>
+      </p:sp>
+    </p:spTree>
+    <p:extLst>
+      <p:ext uri="{BB962C8B-B14F-4D97-AF65-F5344CB8AC3E}">
+        <p14:creationId xmlns:p14="http://schemas.microsoft.com/office/powerpoint/2010/main" val="556164146"/>
+      </p:ext>
+    </p:extLst>
+  </p:cSld>
+  <p:clrMapOvr>
+    <a:masterClrMapping/>
+  </p:clrMapOvr>
+  <mc:AlternateContent xmlns:mc="http://schemas.openxmlformats.org/markup-compatibility/2006" xmlns:p14="http://schemas.microsoft.com/office/powerpoint/2010/main">
+    <mc:Choice Requires="p14">
+      <p:transition spd="slow" p14:dur="2000" advTm="7988"/>
+    </mc:Choice>
+    <mc:Fallback xmlns="">
+      <p:transition spd="slow" advTm="7988"/>
+    </mc:Fallback>
+  </mc:AlternateContent>
+  <p:timing>
+    <p:tnLst>
+      <p:par>
+        <p:cTn id="1" dur="indefinite" restart="never" nodeType="tmRoot"/>
+      </p:par>
+    </p:tnLst>
+  </p:timing>
+</p:sld>
+</file>
+
+<file path=ppt/slides/slide18.xml><?xml version="1.0" encoding="utf-8"?>
+<p:sld xmlns:a="http://schemas.openxmlformats.org/drawingml/2006/main" xmlns:r="http://schemas.openxmlformats.org/officeDocument/2006/relationships" xmlns:p="http://schemas.openxmlformats.org/presentationml/2006/main">
+  <p:cSld>
+    <p:spTree>
+      <p:nvGrpSpPr>
+        <p:cNvPr id="1" name=""/>
+        <p:cNvGrpSpPr/>
+        <p:nvPr/>
+      </p:nvGrpSpPr>
+      <p:grpSpPr>
+        <a:xfrm>
+          <a:off x="0" y="0"/>
+          <a:ext cx="0" cy="0"/>
+          <a:chOff x="0" y="0"/>
+          <a:chExt cx="0" cy="0"/>
+        </a:xfrm>
+      </p:grpSpPr>
+      <p:sp>
+        <p:nvSpPr>
+          <p:cNvPr id="5" name="TextBox 4"/>
+          <p:cNvSpPr txBox="1"/>
+          <p:nvPr/>
+        </p:nvSpPr>
+        <p:spPr>
+          <a:xfrm>
+            <a:off x="0" y="1404252"/>
+            <a:ext cx="12192000" cy="1754326"/>
+          </a:xfrm>
+          <a:prstGeom prst="rect">
+            <a:avLst/>
+          </a:prstGeom>
+          <a:noFill/>
+        </p:spPr>
+        <p:txBody>
+          <a:bodyPr wrap="square" rtlCol="0">
+            <a:spAutoFit/>
+          </a:bodyPr>
+          <a:lstStyle/>
+          <a:p>
+            <a:pPr algn="ctr"/>
+            <a:r>
+              <a:rPr lang="en-US" sz="5400" dirty="0" smtClean="0">
+                <a:latin typeface="+mj-lt"/>
+              </a:rPr>
+              <a:t>It is possible to have too much or too little </a:t>
+            </a:r>
+            <a:r>
+              <a:rPr lang="en-US" sz="5400" smtClean="0">
+                <a:latin typeface="+mj-lt"/>
+              </a:rPr>
+              <a:t>of each virtue (except justice).</a:t>
+            </a:r>
+            <a:endParaRPr lang="en-US" sz="5400" u="sng" dirty="0" smtClean="0">
+              <a:latin typeface="+mj-lt"/>
+            </a:endParaRPr>
+          </a:p>
+        </p:txBody>
+      </p:sp>
+      <p:sp>
+        <p:nvSpPr>
+          <p:cNvPr id="6" name="TextBox 5"/>
+          <p:cNvSpPr txBox="1"/>
+          <p:nvPr/>
+        </p:nvSpPr>
+        <p:spPr>
+          <a:xfrm>
+            <a:off x="57150" y="3842653"/>
+            <a:ext cx="12077700" cy="1754326"/>
+          </a:xfrm>
+          <a:prstGeom prst="rect">
+            <a:avLst/>
+          </a:prstGeom>
+          <a:noFill/>
+        </p:spPr>
+        <p:txBody>
+          <a:bodyPr wrap="square" rtlCol="0">
+            <a:spAutoFit/>
+          </a:bodyPr>
+          <a:lstStyle/>
+          <a:p>
+            <a:pPr algn="ctr"/>
+            <a:r>
+              <a:rPr lang="en-US" sz="5400" dirty="0" smtClean="0">
+                <a:latin typeface="+mj-lt"/>
+              </a:rPr>
+              <a:t>The target value of a virtue is </a:t>
+            </a:r>
+          </a:p>
+          <a:p>
+            <a:pPr algn="ctr"/>
+            <a:r>
+              <a:rPr lang="en-US" sz="5400" dirty="0" smtClean="0">
+                <a:latin typeface="+mj-lt"/>
+              </a:rPr>
+              <a:t>the </a:t>
+            </a:r>
+            <a:r>
+              <a:rPr lang="en-US" sz="5400" u="sng" dirty="0" smtClean="0">
+                <a:latin typeface="+mj-lt"/>
+              </a:rPr>
+              <a:t>golden mean</a:t>
+            </a:r>
+          </a:p>
+        </p:txBody>
+      </p:sp>
+      <p:sp>
+        <p:nvSpPr>
+          <p:cNvPr id="8" name="TextBox 7"/>
+          <p:cNvSpPr txBox="1"/>
+          <p:nvPr/>
+        </p:nvSpPr>
+        <p:spPr>
+          <a:xfrm>
+            <a:off x="57150" y="185052"/>
+            <a:ext cx="12192000" cy="923330"/>
+          </a:xfrm>
+          <a:prstGeom prst="rect">
+            <a:avLst/>
+          </a:prstGeom>
+          <a:noFill/>
+        </p:spPr>
+        <p:txBody>
+          <a:bodyPr wrap="square" rtlCol="0">
+            <a:spAutoFit/>
+          </a:bodyPr>
+          <a:lstStyle/>
+          <a:p>
+            <a:pPr algn="ctr"/>
+            <a:r>
+              <a:rPr lang="en-US" sz="5400" dirty="0" smtClean="0">
+                <a:latin typeface="+mj-lt"/>
+              </a:rPr>
+              <a:t>Virtue Ethics</a:t>
+            </a:r>
+            <a:endParaRPr lang="en-US" sz="5400" u="sng" dirty="0" smtClean="0">
+              <a:latin typeface="+mj-lt"/>
+            </a:endParaRPr>
+          </a:p>
+        </p:txBody>
+      </p:sp>
+    </p:spTree>
+    <p:extLst>
+      <p:ext uri="{BB962C8B-B14F-4D97-AF65-F5344CB8AC3E}">
+        <p14:creationId xmlns:p14="http://schemas.microsoft.com/office/powerpoint/2010/main" val="1652132902"/>
+      </p:ext>
+    </p:extLst>
+  </p:cSld>
+  <p:clrMapOvr>
+    <a:masterClrMapping/>
+  </p:clrMapOvr>
+  <mc:AlternateContent xmlns:mc="http://schemas.openxmlformats.org/markup-compatibility/2006" xmlns:p14="http://schemas.microsoft.com/office/powerpoint/2010/main">
+    <mc:Choice Requires="p14">
+      <p:transition spd="slow" p14:dur="2000" advTm="7988"/>
+    </mc:Choice>
+    <mc:Fallback xmlns="">
+      <p:transition spd="slow" advTm="7988"/>
+    </mc:Fallback>
+  </mc:AlternateContent>
+  <p:timing>
+    <p:tnLst>
+      <p:par>
+        <p:cTn id="1" dur="indefinite" restart="never" nodeType="tmRoot"/>
+      </p:par>
+    </p:tnLst>
+  </p:timing>
+</p:sld>
+</file>
+
 <file path=ppt/slides/slide2.xml><?xml version="1.0" encoding="utf-8"?>
 <p:sld xmlns:a="http://schemas.openxmlformats.org/drawingml/2006/main" xmlns:r="http://schemas.openxmlformats.org/officeDocument/2006/relationships" xmlns:p="http://schemas.openxmlformats.org/presentationml/2006/main">
   <p:cSld>
@@ -3572,9 +5000,6 @@
               </a:rPr>
               <a:t> Utilitarianism (Mill and Bentham)</a:t>
             </a:r>
-            <a:endParaRPr lang="en-US" sz="5400" dirty="0" smtClean="0">
-              <a:latin typeface="+mj-lt"/>
-            </a:endParaRPr>
           </a:p>
         </p:txBody>
       </p:sp>
@@ -3621,11 +5046,11 @@
   <p:clrMapOvr>
     <a:masterClrMapping/>
   </p:clrMapOvr>
-  <mc:AlternateContent xmlns:mc="http://schemas.openxmlformats.org/markup-compatibility/2006">
-    <mc:Choice xmlns:p14="http://schemas.microsoft.com/office/powerpoint/2010/main" Requires="p14">
+  <mc:AlternateContent xmlns:mc="http://schemas.openxmlformats.org/markup-compatibility/2006" xmlns:p14="http://schemas.microsoft.com/office/powerpoint/2010/main">
+    <mc:Choice Requires="p14">
       <p:transition spd="slow" p14:dur="2000" advTm="7127"/>
     </mc:Choice>
-    <mc:Fallback>
+    <mc:Fallback xmlns="">
       <p:transition spd="slow" advTm="7127"/>
     </mc:Fallback>
   </mc:AlternateContent>
@@ -3856,11 +5281,11 @@
   <p:clrMapOvr>
     <a:masterClrMapping/>
   </p:clrMapOvr>
-  <mc:AlternateContent xmlns:mc="http://schemas.openxmlformats.org/markup-compatibility/2006">
-    <mc:Choice xmlns:p14="http://schemas.microsoft.com/office/powerpoint/2010/main" Requires="p14">
+  <mc:AlternateContent xmlns:mc="http://schemas.openxmlformats.org/markup-compatibility/2006" xmlns:p14="http://schemas.microsoft.com/office/powerpoint/2010/main">
+    <mc:Choice Requires="p14">
       <p:transition spd="slow" p14:dur="2000" advTm="5406"/>
     </mc:Choice>
-    <mc:Fallback>
+    <mc:Fallback xmlns="">
       <p:transition spd="slow" advTm="5406"/>
     </mc:Fallback>
   </mc:AlternateContent>
@@ -4109,11 +5534,11 @@
   <p:clrMapOvr>
     <a:masterClrMapping/>
   </p:clrMapOvr>
-  <mc:AlternateContent xmlns:mc="http://schemas.openxmlformats.org/markup-compatibility/2006">
-    <mc:Choice xmlns:p14="http://schemas.microsoft.com/office/powerpoint/2010/main" Requires="p14">
+  <mc:AlternateContent xmlns:mc="http://schemas.openxmlformats.org/markup-compatibility/2006" xmlns:p14="http://schemas.microsoft.com/office/powerpoint/2010/main">
+    <mc:Choice Requires="p14">
       <p:transition spd="slow" p14:dur="2000" advTm="7988"/>
     </mc:Choice>
-    <mc:Fallback>
+    <mc:Fallback xmlns="">
       <p:transition spd="slow" advTm="7988"/>
     </mc:Fallback>
   </mc:AlternateContent>
@@ -4297,11 +5722,11 @@
   <p:clrMapOvr>
     <a:masterClrMapping/>
   </p:clrMapOvr>
-  <mc:AlternateContent xmlns:mc="http://schemas.openxmlformats.org/markup-compatibility/2006">
-    <mc:Choice xmlns:p14="http://schemas.microsoft.com/office/powerpoint/2010/main" Requires="p14">
+  <mc:AlternateContent xmlns:mc="http://schemas.openxmlformats.org/markup-compatibility/2006" xmlns:p14="http://schemas.microsoft.com/office/powerpoint/2010/main">
+    <mc:Choice Requires="p14">
       <p:transition spd="slow" p14:dur="2000" advTm="5505"/>
     </mc:Choice>
-    <mc:Fallback>
+    <mc:Fallback xmlns="">
       <p:transition spd="slow" advTm="5505"/>
     </mc:Fallback>
   </mc:AlternateContent>
@@ -4469,7 +5894,7 @@
               <a:rPr lang="en-US" sz="3600" dirty="0" smtClean="0">
                 <a:latin typeface="+mj-lt"/>
               </a:rPr>
-              <a:t>Utilitarianism = consequentialism + theory of right action</a:t>
+              <a:t>Utilitarianism = consequentialism + value theory</a:t>
             </a:r>
             <a:endParaRPr lang="en-US" sz="3600" dirty="0">
               <a:latin typeface="+mj-lt"/>
@@ -4520,11 +5945,11 @@
   <p:clrMapOvr>
     <a:masterClrMapping/>
   </p:clrMapOvr>
-  <mc:AlternateContent xmlns:mc="http://schemas.openxmlformats.org/markup-compatibility/2006">
-    <mc:Choice xmlns:p14="http://schemas.microsoft.com/office/powerpoint/2010/main" Requires="p14">
+  <mc:AlternateContent xmlns:mc="http://schemas.openxmlformats.org/markup-compatibility/2006" xmlns:p14="http://schemas.microsoft.com/office/powerpoint/2010/main">
+    <mc:Choice Requires="p14">
       <p:transition spd="slow" p14:dur="2000" advTm="4104"/>
     </mc:Choice>
-    <mc:Fallback>
+    <mc:Fallback xmlns="">
       <p:transition spd="slow" advTm="4104"/>
     </mc:Fallback>
   </mc:AlternateContent>
@@ -4612,6 +6037,467 @@
             </p:audio>
           </p:childTnLst>
         </p:cTn>
+      </p:par>
+    </p:tnLst>
+  </p:timing>
+</p:sld>
+</file>
+
+<file path=ppt/slides/slide7.xml><?xml version="1.0" encoding="utf-8"?>
+<p:sld xmlns:a="http://schemas.openxmlformats.org/drawingml/2006/main" xmlns:r="http://schemas.openxmlformats.org/officeDocument/2006/relationships" xmlns:p="http://schemas.openxmlformats.org/presentationml/2006/main">
+  <p:cSld>
+    <p:spTree>
+      <p:nvGrpSpPr>
+        <p:cNvPr id="1" name=""/>
+        <p:cNvGrpSpPr/>
+        <p:nvPr/>
+      </p:nvGrpSpPr>
+      <p:grpSpPr>
+        <a:xfrm>
+          <a:off x="0" y="0"/>
+          <a:ext cx="0" cy="0"/>
+          <a:chOff x="0" y="0"/>
+          <a:chExt cx="0" cy="0"/>
+        </a:xfrm>
+      </p:grpSpPr>
+      <p:sp>
+        <p:nvSpPr>
+          <p:cNvPr id="2" name="Title 1"/>
+          <p:cNvSpPr>
+            <a:spLocks noGrp="1"/>
+          </p:cNvSpPr>
+          <p:nvPr>
+            <p:ph type="ctrTitle"/>
+          </p:nvPr>
+        </p:nvSpPr>
+        <p:spPr>
+          <a:xfrm>
+            <a:off x="1486422" y="0"/>
+            <a:ext cx="9144000" cy="1570733"/>
+          </a:xfrm>
+        </p:spPr>
+        <p:txBody>
+          <a:bodyPr>
+            <a:normAutofit/>
+          </a:bodyPr>
+          <a:lstStyle/>
+          <a:p>
+            <a:r>
+              <a:rPr lang="en-US" smtClean="0"/>
+              <a:t>Utilitarianism</a:t>
+            </a:r>
+            <a:endParaRPr lang="en-US" dirty="0"/>
+          </a:p>
+        </p:txBody>
+      </p:sp>
+      <p:sp>
+        <p:nvSpPr>
+          <p:cNvPr id="3" name="TextBox 2"/>
+          <p:cNvSpPr txBox="1"/>
+          <p:nvPr/>
+        </p:nvSpPr>
+        <p:spPr>
+          <a:xfrm>
+            <a:off x="0" y="1741118"/>
+            <a:ext cx="12191999" cy="646331"/>
+          </a:xfrm>
+          <a:prstGeom prst="rect">
+            <a:avLst/>
+          </a:prstGeom>
+          <a:noFill/>
+        </p:spPr>
+        <p:txBody>
+          <a:bodyPr wrap="square" rtlCol="0">
+            <a:spAutoFit/>
+          </a:bodyPr>
+          <a:lstStyle/>
+          <a:p>
+            <a:pPr algn="ctr"/>
+            <a:r>
+              <a:rPr lang="en-US" sz="3600" dirty="0" smtClean="0">
+                <a:latin typeface="+mj-lt"/>
+              </a:rPr>
+              <a:t>Utilitarianism = consequentialism + theory of right action</a:t>
+            </a:r>
+            <a:endParaRPr lang="en-US" sz="3600" dirty="0">
+              <a:latin typeface="+mj-lt"/>
+            </a:endParaRPr>
+          </a:p>
+        </p:txBody>
+      </p:sp>
+      <p:sp>
+        <p:nvSpPr>
+          <p:cNvPr id="4" name="Rectangle 3"/>
+          <p:cNvSpPr/>
+          <p:nvPr/>
+        </p:nvSpPr>
+        <p:spPr>
+          <a:xfrm>
+            <a:off x="930391" y="2757445"/>
+            <a:ext cx="9616904" cy="1200329"/>
+          </a:xfrm>
+          <a:prstGeom prst="rect">
+            <a:avLst/>
+          </a:prstGeom>
+        </p:spPr>
+        <p:txBody>
+          <a:bodyPr wrap="square">
+            <a:spAutoFit/>
+          </a:bodyPr>
+          <a:lstStyle/>
+          <a:p>
+            <a:r>
+              <a:rPr lang="en-US" sz="3600" u="sng" dirty="0">
+                <a:latin typeface="+mj-lt"/>
+              </a:rPr>
+              <a:t>c</a:t>
+            </a:r>
+            <a:r>
+              <a:rPr lang="en-US" sz="3600" u="sng" dirty="0" smtClean="0">
+                <a:latin typeface="+mj-lt"/>
+              </a:rPr>
+              <a:t>onsequentialism</a:t>
+            </a:r>
+            <a:r>
+              <a:rPr lang="en-US" sz="3600" dirty="0" smtClean="0">
+                <a:latin typeface="+mj-lt"/>
+              </a:rPr>
+              <a:t> determines what the outcomes of actions will be</a:t>
+            </a:r>
+            <a:endParaRPr lang="en-US" sz="3600" dirty="0">
+              <a:latin typeface="+mj-lt"/>
+            </a:endParaRPr>
+          </a:p>
+        </p:txBody>
+      </p:sp>
+      <p:sp>
+        <p:nvSpPr>
+          <p:cNvPr id="6" name="Rectangle 5"/>
+          <p:cNvSpPr/>
+          <p:nvPr/>
+        </p:nvSpPr>
+        <p:spPr>
+          <a:xfrm>
+            <a:off x="1013518" y="4572390"/>
+            <a:ext cx="9616904" cy="646331"/>
+          </a:xfrm>
+          <a:prstGeom prst="rect">
+            <a:avLst/>
+          </a:prstGeom>
+        </p:spPr>
+        <p:txBody>
+          <a:bodyPr wrap="square">
+            <a:spAutoFit/>
+          </a:bodyPr>
+          <a:lstStyle/>
+          <a:p>
+            <a:r>
+              <a:rPr lang="en-US" sz="3600" u="sng" dirty="0" smtClean="0">
+                <a:latin typeface="+mj-lt"/>
+              </a:rPr>
+              <a:t>value theory</a:t>
+            </a:r>
+            <a:r>
+              <a:rPr lang="en-US" sz="3600" dirty="0" smtClean="0">
+                <a:latin typeface="+mj-lt"/>
+              </a:rPr>
+              <a:t> determines what has value</a:t>
+            </a:r>
+            <a:endParaRPr lang="en-US" sz="3600" dirty="0">
+              <a:latin typeface="+mj-lt"/>
+            </a:endParaRPr>
+          </a:p>
+        </p:txBody>
+      </p:sp>
+    </p:spTree>
+    <p:extLst>
+      <p:ext uri="{BB962C8B-B14F-4D97-AF65-F5344CB8AC3E}">
+        <p14:creationId xmlns:p14="http://schemas.microsoft.com/office/powerpoint/2010/main" val="216052035"/>
+      </p:ext>
+    </p:extLst>
+  </p:cSld>
+  <p:clrMapOvr>
+    <a:masterClrMapping/>
+  </p:clrMapOvr>
+  <mc:AlternateContent xmlns:mc="http://schemas.openxmlformats.org/markup-compatibility/2006" xmlns:p14="http://schemas.microsoft.com/office/powerpoint/2010/main">
+    <mc:Choice Requires="p14">
+      <p:transition spd="slow" p14:dur="2000" advTm="4104"/>
+    </mc:Choice>
+    <mc:Fallback xmlns="">
+      <p:transition spd="slow" advTm="4104"/>
+    </mc:Fallback>
+  </mc:AlternateContent>
+  <p:timing>
+    <p:tnLst>
+      <p:par>
+        <p:cTn id="1" dur="indefinite" restart="never" nodeType="tmRoot"/>
+      </p:par>
+    </p:tnLst>
+  </p:timing>
+</p:sld>
+</file>
+
+<file path=ppt/slides/slide8.xml><?xml version="1.0" encoding="utf-8"?>
+<p:sld xmlns:a="http://schemas.openxmlformats.org/drawingml/2006/main" xmlns:r="http://schemas.openxmlformats.org/officeDocument/2006/relationships" xmlns:p="http://schemas.openxmlformats.org/presentationml/2006/main">
+  <p:cSld>
+    <p:spTree>
+      <p:nvGrpSpPr>
+        <p:cNvPr id="1" name=""/>
+        <p:cNvGrpSpPr/>
+        <p:nvPr/>
+      </p:nvGrpSpPr>
+      <p:grpSpPr>
+        <a:xfrm>
+          <a:off x="0" y="0"/>
+          <a:ext cx="0" cy="0"/>
+          <a:chOff x="0" y="0"/>
+          <a:chExt cx="0" cy="0"/>
+        </a:xfrm>
+      </p:grpSpPr>
+      <p:sp>
+        <p:nvSpPr>
+          <p:cNvPr id="2" name="Title 1"/>
+          <p:cNvSpPr>
+            <a:spLocks noGrp="1"/>
+          </p:cNvSpPr>
+          <p:nvPr>
+            <p:ph type="ctrTitle"/>
+          </p:nvPr>
+        </p:nvSpPr>
+        <p:spPr>
+          <a:xfrm>
+            <a:off x="1486422" y="0"/>
+            <a:ext cx="9144000" cy="1570733"/>
+          </a:xfrm>
+        </p:spPr>
+        <p:txBody>
+          <a:bodyPr>
+            <a:normAutofit/>
+          </a:bodyPr>
+          <a:lstStyle/>
+          <a:p>
+            <a:r>
+              <a:rPr lang="en-US" smtClean="0"/>
+              <a:t>Utilitarianism</a:t>
+            </a:r>
+            <a:endParaRPr lang="en-US" dirty="0"/>
+          </a:p>
+        </p:txBody>
+      </p:sp>
+      <p:sp>
+        <p:nvSpPr>
+          <p:cNvPr id="5" name="TextBox 4"/>
+          <p:cNvSpPr txBox="1"/>
+          <p:nvPr/>
+        </p:nvSpPr>
+        <p:spPr>
+          <a:xfrm>
+            <a:off x="877825" y="1871746"/>
+            <a:ext cx="10361193" cy="769441"/>
+          </a:xfrm>
+          <a:prstGeom prst="rect">
+            <a:avLst/>
+          </a:prstGeom>
+          <a:noFill/>
+        </p:spPr>
+        <p:txBody>
+          <a:bodyPr wrap="square" rtlCol="0">
+            <a:spAutoFit/>
+          </a:bodyPr>
+          <a:lstStyle/>
+          <a:p>
+            <a:pPr algn="ctr"/>
+            <a:r>
+              <a:rPr lang="en-US" sz="4400" dirty="0">
+                <a:latin typeface="+mj-lt"/>
+              </a:rPr>
+              <a:t>maximize net aggregate happiness</a:t>
+            </a:r>
+          </a:p>
+        </p:txBody>
+      </p:sp>
+    </p:spTree>
+    <p:extLst>
+      <p:ext uri="{BB962C8B-B14F-4D97-AF65-F5344CB8AC3E}">
+        <p14:creationId xmlns:p14="http://schemas.microsoft.com/office/powerpoint/2010/main" val="1171669338"/>
+      </p:ext>
+    </p:extLst>
+  </p:cSld>
+  <p:clrMapOvr>
+    <a:masterClrMapping/>
+  </p:clrMapOvr>
+  <mc:AlternateContent xmlns:mc="http://schemas.openxmlformats.org/markup-compatibility/2006" xmlns:p14="http://schemas.microsoft.com/office/powerpoint/2010/main">
+    <mc:Choice Requires="p14">
+      <p:transition spd="slow" p14:dur="2000" advTm="4104"/>
+    </mc:Choice>
+    <mc:Fallback xmlns="">
+      <p:transition spd="slow" advTm="4104"/>
+    </mc:Fallback>
+  </mc:AlternateContent>
+  <p:timing>
+    <p:tnLst>
+      <p:par>
+        <p:cTn id="1" dur="indefinite" restart="never" nodeType="tmRoot"/>
+      </p:par>
+    </p:tnLst>
+  </p:timing>
+</p:sld>
+</file>
+
+<file path=ppt/slides/slide9.xml><?xml version="1.0" encoding="utf-8"?>
+<p:sld xmlns:a="http://schemas.openxmlformats.org/drawingml/2006/main" xmlns:r="http://schemas.openxmlformats.org/officeDocument/2006/relationships" xmlns:p="http://schemas.openxmlformats.org/presentationml/2006/main">
+  <p:cSld>
+    <p:spTree>
+      <p:nvGrpSpPr>
+        <p:cNvPr id="1" name=""/>
+        <p:cNvGrpSpPr/>
+        <p:nvPr/>
+      </p:nvGrpSpPr>
+      <p:grpSpPr>
+        <a:xfrm>
+          <a:off x="0" y="0"/>
+          <a:ext cx="0" cy="0"/>
+          <a:chOff x="0" y="0"/>
+          <a:chExt cx="0" cy="0"/>
+        </a:xfrm>
+      </p:grpSpPr>
+      <p:sp>
+        <p:nvSpPr>
+          <p:cNvPr id="2" name="Title 1"/>
+          <p:cNvSpPr>
+            <a:spLocks noGrp="1"/>
+          </p:cNvSpPr>
+          <p:nvPr>
+            <p:ph type="ctrTitle"/>
+          </p:nvPr>
+        </p:nvSpPr>
+        <p:spPr>
+          <a:xfrm>
+            <a:off x="1486422" y="0"/>
+            <a:ext cx="9144000" cy="1570733"/>
+          </a:xfrm>
+        </p:spPr>
+        <p:txBody>
+          <a:bodyPr>
+            <a:normAutofit/>
+          </a:bodyPr>
+          <a:lstStyle/>
+          <a:p>
+            <a:r>
+              <a:rPr lang="en-US" smtClean="0"/>
+              <a:t>Utilitarianism</a:t>
+            </a:r>
+            <a:endParaRPr lang="en-US" dirty="0"/>
+          </a:p>
+        </p:txBody>
+      </p:sp>
+      <p:sp>
+        <p:nvSpPr>
+          <p:cNvPr id="3" name="TextBox 2"/>
+          <p:cNvSpPr txBox="1"/>
+          <p:nvPr/>
+        </p:nvSpPr>
+        <p:spPr>
+          <a:xfrm>
+            <a:off x="877825" y="1871746"/>
+            <a:ext cx="10361193" cy="769441"/>
+          </a:xfrm>
+          <a:prstGeom prst="rect">
+            <a:avLst/>
+          </a:prstGeom>
+          <a:noFill/>
+        </p:spPr>
+        <p:txBody>
+          <a:bodyPr wrap="square" rtlCol="0">
+            <a:spAutoFit/>
+          </a:bodyPr>
+          <a:lstStyle/>
+          <a:p>
+            <a:pPr algn="ctr"/>
+            <a:r>
+              <a:rPr lang="en-US" sz="4400" dirty="0">
+                <a:latin typeface="+mj-lt"/>
+              </a:rPr>
+              <a:t>maximize net aggregate happiness</a:t>
+            </a:r>
+          </a:p>
+        </p:txBody>
+      </p:sp>
+      <p:sp>
+        <p:nvSpPr>
+          <p:cNvPr id="7" name="TextBox 6"/>
+          <p:cNvSpPr txBox="1"/>
+          <p:nvPr/>
+        </p:nvSpPr>
+        <p:spPr>
+          <a:xfrm>
+            <a:off x="970849" y="3176053"/>
+            <a:ext cx="10361193" cy="1446550"/>
+          </a:xfrm>
+          <a:prstGeom prst="rect">
+            <a:avLst/>
+          </a:prstGeom>
+          <a:noFill/>
+        </p:spPr>
+        <p:txBody>
+          <a:bodyPr wrap="square" rtlCol="0">
+            <a:spAutoFit/>
+          </a:bodyPr>
+          <a:lstStyle/>
+          <a:p>
+            <a:pPr algn="ctr"/>
+            <a:r>
+              <a:rPr lang="en-US" sz="4400" u="sng" dirty="0" smtClean="0">
+                <a:latin typeface="+mj-lt"/>
+              </a:rPr>
+              <a:t>happiness</a:t>
+            </a:r>
+            <a:r>
+              <a:rPr lang="en-US" sz="4400" dirty="0" smtClean="0">
+                <a:latin typeface="+mj-lt"/>
+              </a:rPr>
+              <a:t> or </a:t>
+            </a:r>
+            <a:r>
+              <a:rPr lang="en-US" sz="4400" u="sng" dirty="0" smtClean="0">
+                <a:latin typeface="+mj-lt"/>
+              </a:rPr>
+              <a:t>utility</a:t>
+            </a:r>
+            <a:r>
+              <a:rPr lang="en-US" sz="4400" dirty="0" smtClean="0">
+                <a:latin typeface="+mj-lt"/>
+              </a:rPr>
+              <a:t> is pleasure in the absence of pain</a:t>
+            </a:r>
+            <a:endParaRPr lang="en-US" sz="4400" dirty="0">
+              <a:latin typeface="+mj-lt"/>
+            </a:endParaRPr>
+          </a:p>
+        </p:txBody>
+      </p:sp>
+    </p:spTree>
+    <p:extLst>
+      <p:ext uri="{BB962C8B-B14F-4D97-AF65-F5344CB8AC3E}">
+        <p14:creationId xmlns:p14="http://schemas.microsoft.com/office/powerpoint/2010/main" val="846049148"/>
+      </p:ext>
+    </p:extLst>
+  </p:cSld>
+  <p:clrMapOvr>
+    <a:masterClrMapping/>
+  </p:clrMapOvr>
+  <mc:AlternateContent xmlns:mc="http://schemas.openxmlformats.org/markup-compatibility/2006" xmlns:p14="http://schemas.microsoft.com/office/powerpoint/2010/main">
+    <mc:Choice Requires="p14">
+      <p:transition spd="slow" p14:dur="2000" advTm="4104"/>
+    </mc:Choice>
+    <mc:Fallback xmlns="">
+      <p:transition spd="slow" advTm="4104"/>
+    </mc:Fallback>
+  </mc:AlternateContent>
+  <p:timing>
+    <p:tnLst>
+      <p:par>
+        <p:cTn id="1" dur="indefinite" restart="never" nodeType="tmRoot"/>
       </p:par>
     </p:tnLst>
   </p:timing>

</xml_diff>

<commit_message>
More content in presentation 1.
</commit_message>
<xml_diff>
--- a/Presentation1.pptx
+++ b/Presentation1.pptx
@@ -5,7 +5,7 @@
     <p:sldMasterId id="2147483648" r:id="rId1"/>
   </p:sldMasterIdLst>
   <p:notesMasterIdLst>
-    <p:notesMasterId r:id="rId20"/>
+    <p:notesMasterId r:id="rId25"/>
   </p:notesMasterIdLst>
   <p:sldIdLst>
     <p:sldId id="256" r:id="rId2"/>
@@ -19,13 +19,18 @@
     <p:sldId id="268" r:id="rId10"/>
     <p:sldId id="269" r:id="rId11"/>
     <p:sldId id="264" r:id="rId12"/>
-    <p:sldId id="266" r:id="rId13"/>
-    <p:sldId id="267" r:id="rId14"/>
-    <p:sldId id="270" r:id="rId15"/>
-    <p:sldId id="271" r:id="rId16"/>
-    <p:sldId id="272" r:id="rId17"/>
-    <p:sldId id="273" r:id="rId18"/>
-    <p:sldId id="276" r:id="rId19"/>
+    <p:sldId id="277" r:id="rId13"/>
+    <p:sldId id="266" r:id="rId14"/>
+    <p:sldId id="267" r:id="rId15"/>
+    <p:sldId id="270" r:id="rId16"/>
+    <p:sldId id="271" r:id="rId17"/>
+    <p:sldId id="278" r:id="rId18"/>
+    <p:sldId id="272" r:id="rId19"/>
+    <p:sldId id="273" r:id="rId20"/>
+    <p:sldId id="276" r:id="rId21"/>
+    <p:sldId id="279" r:id="rId22"/>
+    <p:sldId id="280" r:id="rId23"/>
+    <p:sldId id="281" r:id="rId24"/>
   </p:sldIdLst>
   <p:sldSz cx="12192000" cy="6858000"/>
   <p:notesSz cx="6858000" cy="9144000"/>
@@ -214,7 +219,7 @@
           <a:p>
             <a:fld id="{6BEEFB0F-FC82-F341-8F73-F9813FD8CB1C}" type="datetimeFigureOut">
               <a:rPr lang="en-US" smtClean="0"/>
-              <a:t>10/7/18</a:t>
+              <a:t>10/26/18</a:t>
             </a:fld>
             <a:endParaRPr lang="en-US"/>
           </a:p>
@@ -482,6 +487,282 @@
 </p:notesMaster>
 </file>
 
+<file path=ppt/notesSlides/notesSlide1.xml><?xml version="1.0" encoding="utf-8"?>
+<p:notes xmlns:a="http://schemas.openxmlformats.org/drawingml/2006/main" xmlns:r="http://schemas.openxmlformats.org/officeDocument/2006/relationships" xmlns:p="http://schemas.openxmlformats.org/presentationml/2006/main">
+  <p:cSld>
+    <p:spTree>
+      <p:nvGrpSpPr>
+        <p:cNvPr id="1" name=""/>
+        <p:cNvGrpSpPr/>
+        <p:nvPr/>
+      </p:nvGrpSpPr>
+      <p:grpSpPr>
+        <a:xfrm>
+          <a:off x="0" y="0"/>
+          <a:ext cx="0" cy="0"/>
+          <a:chOff x="0" y="0"/>
+          <a:chExt cx="0" cy="0"/>
+        </a:xfrm>
+      </p:grpSpPr>
+      <p:sp>
+        <p:nvSpPr>
+          <p:cNvPr id="2" name="Slide Image Placeholder 1"/>
+          <p:cNvSpPr>
+            <a:spLocks noGrp="1" noRot="1" noChangeAspect="1"/>
+          </p:cNvSpPr>
+          <p:nvPr>
+            <p:ph type="sldImg"/>
+          </p:nvPr>
+        </p:nvSpPr>
+        <p:spPr/>
+      </p:sp>
+      <p:sp>
+        <p:nvSpPr>
+          <p:cNvPr id="3" name="Notes Placeholder 2"/>
+          <p:cNvSpPr>
+            <a:spLocks noGrp="1"/>
+          </p:cNvSpPr>
+          <p:nvPr>
+            <p:ph type="body" idx="1"/>
+          </p:nvPr>
+        </p:nvSpPr>
+        <p:spPr/>
+        <p:txBody>
+          <a:bodyPr/>
+          <a:lstStyle/>
+          <a:p>
+            <a:r>
+              <a:rPr lang="en-US" dirty="0" smtClean="0"/>
+              <a:t>When</a:t>
+            </a:r>
+            <a:r>
+              <a:rPr lang="en-US" baseline="0" dirty="0" smtClean="0"/>
+              <a:t> multiple actions are available, </a:t>
+            </a:r>
+            <a:r>
+              <a:rPr lang="en-US" dirty="0" smtClean="0"/>
+              <a:t>Utilitarianism obligates the individual to take</a:t>
+            </a:r>
+            <a:r>
+              <a:rPr lang="en-US" baseline="0" dirty="0" smtClean="0"/>
+              <a:t> the action that maximizes net aggregate happiness.</a:t>
+            </a:r>
+            <a:endParaRPr lang="en-US" dirty="0"/>
+          </a:p>
+        </p:txBody>
+      </p:sp>
+      <p:sp>
+        <p:nvSpPr>
+          <p:cNvPr id="4" name="Slide Number Placeholder 3"/>
+          <p:cNvSpPr>
+            <a:spLocks noGrp="1"/>
+          </p:cNvSpPr>
+          <p:nvPr>
+            <p:ph type="sldNum" sz="quarter" idx="10"/>
+          </p:nvPr>
+        </p:nvSpPr>
+        <p:spPr/>
+        <p:txBody>
+          <a:bodyPr/>
+          <a:lstStyle/>
+          <a:p>
+            <a:fld id="{728594E6-DDB0-6145-B532-120E07FB5D06}" type="slidenum">
+              <a:rPr lang="en-US" smtClean="0"/>
+              <a:t>8</a:t>
+            </a:fld>
+            <a:endParaRPr lang="en-US"/>
+          </a:p>
+        </p:txBody>
+      </p:sp>
+    </p:spTree>
+    <p:extLst>
+      <p:ext uri="{BB962C8B-B14F-4D97-AF65-F5344CB8AC3E}">
+        <p14:creationId xmlns:p14="http://schemas.microsoft.com/office/powerpoint/2010/main" val="551259582"/>
+      </p:ext>
+    </p:extLst>
+  </p:cSld>
+  <p:clrMapOvr>
+    <a:masterClrMapping/>
+  </p:clrMapOvr>
+</p:notes>
+</file>
+
+<file path=ppt/notesSlides/notesSlide2.xml><?xml version="1.0" encoding="utf-8"?>
+<p:notes xmlns:a="http://schemas.openxmlformats.org/drawingml/2006/main" xmlns:r="http://schemas.openxmlformats.org/officeDocument/2006/relationships" xmlns:p="http://schemas.openxmlformats.org/presentationml/2006/main">
+  <p:cSld>
+    <p:spTree>
+      <p:nvGrpSpPr>
+        <p:cNvPr id="1" name=""/>
+        <p:cNvGrpSpPr/>
+        <p:nvPr/>
+      </p:nvGrpSpPr>
+      <p:grpSpPr>
+        <a:xfrm>
+          <a:off x="0" y="0"/>
+          <a:ext cx="0" cy="0"/>
+          <a:chOff x="0" y="0"/>
+          <a:chExt cx="0" cy="0"/>
+        </a:xfrm>
+      </p:grpSpPr>
+      <p:sp>
+        <p:nvSpPr>
+          <p:cNvPr id="2" name="Slide Image Placeholder 1"/>
+          <p:cNvSpPr>
+            <a:spLocks noGrp="1" noRot="1" noChangeAspect="1"/>
+          </p:cNvSpPr>
+          <p:nvPr>
+            <p:ph type="sldImg"/>
+          </p:nvPr>
+        </p:nvSpPr>
+        <p:spPr/>
+      </p:sp>
+      <p:sp>
+        <p:nvSpPr>
+          <p:cNvPr id="3" name="Notes Placeholder 2"/>
+          <p:cNvSpPr>
+            <a:spLocks noGrp="1"/>
+          </p:cNvSpPr>
+          <p:nvPr>
+            <p:ph type="body" idx="1"/>
+          </p:nvPr>
+        </p:nvSpPr>
+        <p:spPr/>
+        <p:txBody>
+          <a:bodyPr/>
+          <a:lstStyle/>
+          <a:p>
+            <a:endParaRPr lang="en-US" dirty="0"/>
+          </a:p>
+        </p:txBody>
+      </p:sp>
+      <p:sp>
+        <p:nvSpPr>
+          <p:cNvPr id="4" name="Slide Number Placeholder 3"/>
+          <p:cNvSpPr>
+            <a:spLocks noGrp="1"/>
+          </p:cNvSpPr>
+          <p:nvPr>
+            <p:ph type="sldNum" sz="quarter" idx="10"/>
+          </p:nvPr>
+        </p:nvSpPr>
+        <p:spPr/>
+        <p:txBody>
+          <a:bodyPr/>
+          <a:lstStyle/>
+          <a:p>
+            <a:fld id="{728594E6-DDB0-6145-B532-120E07FB5D06}" type="slidenum">
+              <a:rPr lang="en-US" smtClean="0"/>
+              <a:t>9</a:t>
+            </a:fld>
+            <a:endParaRPr lang="en-US"/>
+          </a:p>
+        </p:txBody>
+      </p:sp>
+    </p:spTree>
+    <p:extLst>
+      <p:ext uri="{BB962C8B-B14F-4D97-AF65-F5344CB8AC3E}">
+        <p14:creationId xmlns:p14="http://schemas.microsoft.com/office/powerpoint/2010/main" val="1788110957"/>
+      </p:ext>
+    </p:extLst>
+  </p:cSld>
+  <p:clrMapOvr>
+    <a:masterClrMapping/>
+  </p:clrMapOvr>
+</p:notes>
+</file>
+
+<file path=ppt/notesSlides/notesSlide3.xml><?xml version="1.0" encoding="utf-8"?>
+<p:notes xmlns:a="http://schemas.openxmlformats.org/drawingml/2006/main" xmlns:r="http://schemas.openxmlformats.org/officeDocument/2006/relationships" xmlns:p="http://schemas.openxmlformats.org/presentationml/2006/main">
+  <p:cSld>
+    <p:spTree>
+      <p:nvGrpSpPr>
+        <p:cNvPr id="1" name=""/>
+        <p:cNvGrpSpPr/>
+        <p:nvPr/>
+      </p:nvGrpSpPr>
+      <p:grpSpPr>
+        <a:xfrm>
+          <a:off x="0" y="0"/>
+          <a:ext cx="0" cy="0"/>
+          <a:chOff x="0" y="0"/>
+          <a:chExt cx="0" cy="0"/>
+        </a:xfrm>
+      </p:grpSpPr>
+      <p:sp>
+        <p:nvSpPr>
+          <p:cNvPr id="2" name="Slide Image Placeholder 1"/>
+          <p:cNvSpPr>
+            <a:spLocks noGrp="1" noRot="1" noChangeAspect="1"/>
+          </p:cNvSpPr>
+          <p:nvPr>
+            <p:ph type="sldImg"/>
+          </p:nvPr>
+        </p:nvSpPr>
+        <p:spPr/>
+      </p:sp>
+      <p:sp>
+        <p:nvSpPr>
+          <p:cNvPr id="3" name="Notes Placeholder 2"/>
+          <p:cNvSpPr>
+            <a:spLocks noGrp="1"/>
+          </p:cNvSpPr>
+          <p:nvPr>
+            <p:ph type="body" idx="1"/>
+          </p:nvPr>
+        </p:nvSpPr>
+        <p:spPr/>
+        <p:txBody>
+          <a:bodyPr/>
+          <a:lstStyle/>
+          <a:p>
+            <a:r>
+              <a:rPr lang="en-US" dirty="0" smtClean="0"/>
+              <a:t>One</a:t>
+            </a:r>
+            <a:r>
+              <a:rPr lang="en-US" baseline="0" dirty="0" smtClean="0"/>
+              <a:t> more idea proposed by Aristotle is the function argument.  Aristotle argued that something is good if it is doing its function well.</a:t>
+            </a:r>
+            <a:endParaRPr lang="en-US" dirty="0"/>
+          </a:p>
+        </p:txBody>
+      </p:sp>
+      <p:sp>
+        <p:nvSpPr>
+          <p:cNvPr id="4" name="Slide Number Placeholder 3"/>
+          <p:cNvSpPr>
+            <a:spLocks noGrp="1"/>
+          </p:cNvSpPr>
+          <p:nvPr>
+            <p:ph type="sldNum" sz="quarter" idx="10"/>
+          </p:nvPr>
+        </p:nvSpPr>
+        <p:spPr/>
+        <p:txBody>
+          <a:bodyPr/>
+          <a:lstStyle/>
+          <a:p>
+            <a:fld id="{728594E6-DDB0-6145-B532-120E07FB5D06}" type="slidenum">
+              <a:rPr lang="en-US" smtClean="0"/>
+              <a:t>22</a:t>
+            </a:fld>
+            <a:endParaRPr lang="en-US"/>
+          </a:p>
+        </p:txBody>
+      </p:sp>
+    </p:spTree>
+    <p:extLst>
+      <p:ext uri="{BB962C8B-B14F-4D97-AF65-F5344CB8AC3E}">
+        <p14:creationId xmlns:p14="http://schemas.microsoft.com/office/powerpoint/2010/main" val="955036416"/>
+      </p:ext>
+    </p:extLst>
+  </p:cSld>
+  <p:clrMapOvr>
+    <a:masterClrMapping/>
+  </p:clrMapOvr>
+</p:notes>
+</file>
+
 <file path=ppt/slideLayouts/slideLayout1.xml><?xml version="1.0" encoding="utf-8"?>
 <p:sldLayout xmlns:a="http://schemas.openxmlformats.org/drawingml/2006/main" xmlns:r="http://schemas.openxmlformats.org/officeDocument/2006/relationships" xmlns:p="http://schemas.openxmlformats.org/presentationml/2006/main" type="title" preserve="1">
   <p:cSld name="Title Slide">
@@ -613,7 +894,7 @@
           <a:p>
             <a:fld id="{5DA7BCF0-81A2-F14F-9732-11E21E99EC3D}" type="datetimeFigureOut">
               <a:rPr lang="en-US" smtClean="0"/>
-              <a:t>10/7/18</a:t>
+              <a:t>10/26/18</a:t>
             </a:fld>
             <a:endParaRPr lang="en-US"/>
           </a:p>
@@ -783,7 +1064,7 @@
           <a:p>
             <a:fld id="{5DA7BCF0-81A2-F14F-9732-11E21E99EC3D}" type="datetimeFigureOut">
               <a:rPr lang="en-US" smtClean="0"/>
-              <a:t>10/7/18</a:t>
+              <a:t>10/26/18</a:t>
             </a:fld>
             <a:endParaRPr lang="en-US"/>
           </a:p>
@@ -963,7 +1244,7 @@
           <a:p>
             <a:fld id="{5DA7BCF0-81A2-F14F-9732-11E21E99EC3D}" type="datetimeFigureOut">
               <a:rPr lang="en-US" smtClean="0"/>
-              <a:t>10/7/18</a:t>
+              <a:t>10/26/18</a:t>
             </a:fld>
             <a:endParaRPr lang="en-US"/>
           </a:p>
@@ -1133,7 +1414,7 @@
           <a:p>
             <a:fld id="{5DA7BCF0-81A2-F14F-9732-11E21E99EC3D}" type="datetimeFigureOut">
               <a:rPr lang="en-US" smtClean="0"/>
-              <a:t>10/7/18</a:t>
+              <a:t>10/26/18</a:t>
             </a:fld>
             <a:endParaRPr lang="en-US"/>
           </a:p>
@@ -1379,7 +1660,7 @@
           <a:p>
             <a:fld id="{5DA7BCF0-81A2-F14F-9732-11E21E99EC3D}" type="datetimeFigureOut">
               <a:rPr lang="en-US" smtClean="0"/>
-              <a:t>10/7/18</a:t>
+              <a:t>10/26/18</a:t>
             </a:fld>
             <a:endParaRPr lang="en-US"/>
           </a:p>
@@ -1611,7 +1892,7 @@
           <a:p>
             <a:fld id="{5DA7BCF0-81A2-F14F-9732-11E21E99EC3D}" type="datetimeFigureOut">
               <a:rPr lang="en-US" smtClean="0"/>
-              <a:t>10/7/18</a:t>
+              <a:t>10/26/18</a:t>
             </a:fld>
             <a:endParaRPr lang="en-US"/>
           </a:p>
@@ -1978,7 +2259,7 @@
           <a:p>
             <a:fld id="{5DA7BCF0-81A2-F14F-9732-11E21E99EC3D}" type="datetimeFigureOut">
               <a:rPr lang="en-US" smtClean="0"/>
-              <a:t>10/7/18</a:t>
+              <a:t>10/26/18</a:t>
             </a:fld>
             <a:endParaRPr lang="en-US"/>
           </a:p>
@@ -2096,7 +2377,7 @@
           <a:p>
             <a:fld id="{5DA7BCF0-81A2-F14F-9732-11E21E99EC3D}" type="datetimeFigureOut">
               <a:rPr lang="en-US" smtClean="0"/>
-              <a:t>10/7/18</a:t>
+              <a:t>10/26/18</a:t>
             </a:fld>
             <a:endParaRPr lang="en-US"/>
           </a:p>
@@ -2191,7 +2472,7 @@
           <a:p>
             <a:fld id="{5DA7BCF0-81A2-F14F-9732-11E21E99EC3D}" type="datetimeFigureOut">
               <a:rPr lang="en-US" smtClean="0"/>
-              <a:t>10/7/18</a:t>
+              <a:t>10/26/18</a:t>
             </a:fld>
             <a:endParaRPr lang="en-US"/>
           </a:p>
@@ -2468,7 +2749,7 @@
           <a:p>
             <a:fld id="{5DA7BCF0-81A2-F14F-9732-11E21E99EC3D}" type="datetimeFigureOut">
               <a:rPr lang="en-US" smtClean="0"/>
-              <a:t>10/7/18</a:t>
+              <a:t>10/26/18</a:t>
             </a:fld>
             <a:endParaRPr lang="en-US"/>
           </a:p>
@@ -2721,7 +3002,7 @@
           <a:p>
             <a:fld id="{5DA7BCF0-81A2-F14F-9732-11E21E99EC3D}" type="datetimeFigureOut">
               <a:rPr lang="en-US" smtClean="0"/>
-              <a:t>10/7/18</a:t>
+              <a:t>10/26/18</a:t>
             </a:fld>
             <a:endParaRPr lang="en-US"/>
           </a:p>
@@ -2934,7 +3215,7 @@
           <a:p>
             <a:fld id="{5DA7BCF0-81A2-F14F-9732-11E21E99EC3D}" type="datetimeFigureOut">
               <a:rPr lang="en-US" smtClean="0"/>
-              <a:t>10/7/18</a:t>
+              <a:t>10/26/18</a:t>
             </a:fld>
             <a:endParaRPr lang="en-US"/>
           </a:p>
@@ -3591,14 +3872,14 @@
       </p:sp>
       <p:sp>
         <p:nvSpPr>
-          <p:cNvPr id="7" name="TextBox 6"/>
+          <p:cNvPr id="8" name="TextBox 7"/>
           <p:cNvSpPr txBox="1"/>
           <p:nvPr/>
         </p:nvSpPr>
         <p:spPr>
           <a:xfrm>
-            <a:off x="970849" y="3176053"/>
-            <a:ext cx="10361193" cy="1446550"/>
+            <a:off x="877825" y="4772748"/>
+            <a:ext cx="10361193" cy="769441"/>
           </a:xfrm>
           <a:prstGeom prst="rect">
             <a:avLst/>
@@ -3613,28 +3894,22 @@
           <a:p>
             <a:pPr algn="ctr"/>
             <a:r>
+              <a:rPr lang="en-US" sz="4400" u="sng" dirty="0">
+                <a:latin typeface="+mj-lt"/>
+              </a:rPr>
+              <a:t>n</a:t>
+            </a:r>
+            <a:r>
               <a:rPr lang="en-US" sz="4400" u="sng" dirty="0" smtClean="0">
                 <a:latin typeface="+mj-lt"/>
               </a:rPr>
-              <a:t>happiness</a:t>
+              <a:t>et</a:t>
             </a:r>
             <a:r>
               <a:rPr lang="en-US" sz="4400" dirty="0" smtClean="0">
                 <a:latin typeface="+mj-lt"/>
               </a:rPr>
-              <a:t> or </a:t>
-            </a:r>
-            <a:r>
-              <a:rPr lang="en-US" sz="4400" u="sng" dirty="0" smtClean="0">
-                <a:latin typeface="+mj-lt"/>
-              </a:rPr>
-              <a:t>utility</a:t>
-            </a:r>
-            <a:r>
-              <a:rPr lang="en-US" sz="4400" dirty="0" smtClean="0">
-                <a:latin typeface="+mj-lt"/>
-              </a:rPr>
-              <a:t> is pleasure in the absence of pain</a:t>
+              <a:t> means good minus bad</a:t>
             </a:r>
             <a:endParaRPr lang="en-US" sz="4400" dirty="0">
               <a:latin typeface="+mj-lt"/>
@@ -3644,14 +3919,14 @@
       </p:sp>
       <p:sp>
         <p:nvSpPr>
-          <p:cNvPr id="8" name="TextBox 7"/>
+          <p:cNvPr id="6" name="TextBox 5"/>
           <p:cNvSpPr txBox="1"/>
           <p:nvPr/>
         </p:nvSpPr>
         <p:spPr>
           <a:xfrm>
-            <a:off x="877825" y="4772748"/>
-            <a:ext cx="10361193" cy="769441"/>
+            <a:off x="606156" y="3187929"/>
+            <a:ext cx="10904530" cy="769441"/>
           </a:xfrm>
           <a:prstGeom prst="rect">
             <a:avLst/>
@@ -3666,22 +3941,40 @@
           <a:p>
             <a:pPr algn="ctr"/>
             <a:r>
-              <a:rPr lang="en-US" sz="4400" u="sng" dirty="0">
-                <a:latin typeface="+mj-lt"/>
-              </a:rPr>
-              <a:t>n</a:t>
-            </a:r>
-            <a:r>
-              <a:rPr lang="en-US" sz="4400" u="sng" dirty="0" smtClean="0">
-                <a:latin typeface="+mj-lt"/>
-              </a:rPr>
-              <a:t>et</a:t>
+              <a:rPr lang="en-US" sz="4400" u="sng" smtClean="0">
+                <a:latin typeface="+mj-lt"/>
+              </a:rPr>
+              <a:t>happiness</a:t>
+            </a:r>
+            <a:r>
+              <a:rPr lang="en-US" sz="4400" smtClean="0">
+                <a:latin typeface="+mj-lt"/>
+              </a:rPr>
+              <a:t> </a:t>
+            </a:r>
+            <a:r>
+              <a:rPr lang="en-US" sz="4400" smtClean="0">
+                <a:latin typeface="+mj-lt"/>
+              </a:rPr>
+              <a:t>is </a:t>
             </a:r>
             <a:r>
               <a:rPr lang="en-US" sz="4400" dirty="0" smtClean="0">
                 <a:latin typeface="+mj-lt"/>
               </a:rPr>
-              <a:t> means good minus bad</a:t>
+              <a:t>pleasure </a:t>
+            </a:r>
+            <a:r>
+              <a:rPr lang="en-US" sz="4400" dirty="0" smtClean="0">
+                <a:latin typeface="+mj-lt"/>
+              </a:rPr>
+              <a:t>and the </a:t>
+            </a:r>
+            <a:r>
+              <a:rPr lang="en-US" sz="4400" dirty="0" smtClean="0">
+                <a:latin typeface="+mj-lt"/>
+              </a:rPr>
+              <a:t>absence of pain</a:t>
             </a:r>
             <a:endParaRPr lang="en-US" sz="4400" dirty="0">
               <a:latin typeface="+mj-lt"/>
@@ -3798,14 +4091,14 @@
       </p:sp>
       <p:sp>
         <p:nvSpPr>
-          <p:cNvPr id="7" name="TextBox 6"/>
+          <p:cNvPr id="8" name="TextBox 7"/>
           <p:cNvSpPr txBox="1"/>
           <p:nvPr/>
         </p:nvSpPr>
         <p:spPr>
           <a:xfrm>
-            <a:off x="970849" y="3176053"/>
-            <a:ext cx="10361193" cy="1446550"/>
+            <a:off x="877825" y="4772748"/>
+            <a:ext cx="10361193" cy="769441"/>
           </a:xfrm>
           <a:prstGeom prst="rect">
             <a:avLst/>
@@ -3820,28 +4113,22 @@
           <a:p>
             <a:pPr algn="ctr"/>
             <a:r>
+              <a:rPr lang="en-US" sz="4400" u="sng" dirty="0">
+                <a:latin typeface="+mj-lt"/>
+              </a:rPr>
+              <a:t>n</a:t>
+            </a:r>
+            <a:r>
               <a:rPr lang="en-US" sz="4400" u="sng" dirty="0" smtClean="0">
                 <a:latin typeface="+mj-lt"/>
               </a:rPr>
-              <a:t>happiness</a:t>
+              <a:t>et</a:t>
             </a:r>
             <a:r>
               <a:rPr lang="en-US" sz="4400" dirty="0" smtClean="0">
                 <a:latin typeface="+mj-lt"/>
               </a:rPr>
-              <a:t> or </a:t>
-            </a:r>
-            <a:r>
-              <a:rPr lang="en-US" sz="4400" u="sng" dirty="0" smtClean="0">
-                <a:latin typeface="+mj-lt"/>
-              </a:rPr>
-              <a:t>utility</a:t>
-            </a:r>
-            <a:r>
-              <a:rPr lang="en-US" sz="4400" dirty="0" smtClean="0">
-                <a:latin typeface="+mj-lt"/>
-              </a:rPr>
-              <a:t> is pleasure in the absence of pain</a:t>
+              <a:t> means good minus bad</a:t>
             </a:r>
             <a:endParaRPr lang="en-US" sz="4400" dirty="0">
               <a:latin typeface="+mj-lt"/>
@@ -3851,13 +4138,13 @@
       </p:sp>
       <p:sp>
         <p:nvSpPr>
-          <p:cNvPr id="8" name="TextBox 7"/>
+          <p:cNvPr id="9" name="TextBox 8"/>
           <p:cNvSpPr txBox="1"/>
           <p:nvPr/>
         </p:nvSpPr>
         <p:spPr>
           <a:xfrm>
-            <a:off x="877825" y="4772748"/>
+            <a:off x="877825" y="5542189"/>
             <a:ext cx="10361193" cy="769441"/>
           </a:xfrm>
           <a:prstGeom prst="rect">
@@ -3873,22 +4160,16 @@
           <a:p>
             <a:pPr algn="ctr"/>
             <a:r>
-              <a:rPr lang="en-US" sz="4400" u="sng" dirty="0">
-                <a:latin typeface="+mj-lt"/>
-              </a:rPr>
-              <a:t>n</a:t>
-            </a:r>
-            <a:r>
               <a:rPr lang="en-US" sz="4400" u="sng" dirty="0" smtClean="0">
                 <a:latin typeface="+mj-lt"/>
               </a:rPr>
-              <a:t>et</a:t>
+              <a:t>aggregate</a:t>
             </a:r>
             <a:r>
               <a:rPr lang="en-US" sz="4400" dirty="0" smtClean="0">
                 <a:latin typeface="+mj-lt"/>
               </a:rPr>
-              <a:t> means good minus bad</a:t>
+              <a:t> means sum for all individuals</a:t>
             </a:r>
             <a:endParaRPr lang="en-US" sz="4400" dirty="0">
               <a:latin typeface="+mj-lt"/>
@@ -3898,14 +4179,14 @@
       </p:sp>
       <p:sp>
         <p:nvSpPr>
-          <p:cNvPr id="9" name="TextBox 8"/>
+          <p:cNvPr id="10" name="TextBox 9"/>
           <p:cNvSpPr txBox="1"/>
           <p:nvPr/>
         </p:nvSpPr>
         <p:spPr>
           <a:xfrm>
-            <a:off x="877825" y="5542189"/>
-            <a:ext cx="10361193" cy="769441"/>
+            <a:off x="606156" y="3187929"/>
+            <a:ext cx="10904530" cy="769441"/>
           </a:xfrm>
           <a:prstGeom prst="rect">
             <a:avLst/>
@@ -3920,16 +4201,40 @@
           <a:p>
             <a:pPr algn="ctr"/>
             <a:r>
-              <a:rPr lang="en-US" sz="4400" u="sng" dirty="0" smtClean="0">
-                <a:latin typeface="+mj-lt"/>
-              </a:rPr>
-              <a:t>aggregate</a:t>
+              <a:rPr lang="en-US" sz="4400" u="sng" smtClean="0">
+                <a:latin typeface="+mj-lt"/>
+              </a:rPr>
+              <a:t>happiness</a:t>
+            </a:r>
+            <a:r>
+              <a:rPr lang="en-US" sz="4400" smtClean="0">
+                <a:latin typeface="+mj-lt"/>
+              </a:rPr>
+              <a:t> </a:t>
+            </a:r>
+            <a:r>
+              <a:rPr lang="en-US" sz="4400" smtClean="0">
+                <a:latin typeface="+mj-lt"/>
+              </a:rPr>
+              <a:t>is </a:t>
             </a:r>
             <a:r>
               <a:rPr lang="en-US" sz="4400" dirty="0" smtClean="0">
                 <a:latin typeface="+mj-lt"/>
               </a:rPr>
-              <a:t> means sum for all individuals</a:t>
+              <a:t>pleasure </a:t>
+            </a:r>
+            <a:r>
+              <a:rPr lang="en-US" sz="4400" dirty="0" smtClean="0">
+                <a:latin typeface="+mj-lt"/>
+              </a:rPr>
+              <a:t>and the </a:t>
+            </a:r>
+            <a:r>
+              <a:rPr lang="en-US" sz="4400" dirty="0" smtClean="0">
+                <a:latin typeface="+mj-lt"/>
+              </a:rPr>
+              <a:t>absence of pain</a:t>
             </a:r>
             <a:endParaRPr lang="en-US" sz="4400" dirty="0">
               <a:latin typeface="+mj-lt"/>
@@ -3984,14 +4289,44 @@
       </p:grpSpPr>
       <p:sp>
         <p:nvSpPr>
-          <p:cNvPr id="5" name="TextBox 4"/>
+          <p:cNvPr id="2" name="Title 1"/>
+          <p:cNvSpPr>
+            <a:spLocks noGrp="1"/>
+          </p:cNvSpPr>
+          <p:nvPr>
+            <p:ph type="ctrTitle"/>
+          </p:nvPr>
+        </p:nvSpPr>
+        <p:spPr>
+          <a:xfrm>
+            <a:off x="1486422" y="0"/>
+            <a:ext cx="9144000" cy="1570733"/>
+          </a:xfrm>
+        </p:spPr>
+        <p:txBody>
+          <a:bodyPr>
+            <a:normAutofit/>
+          </a:bodyPr>
+          <a:lstStyle/>
+          <a:p>
+            <a:r>
+              <a:rPr lang="en-US" smtClean="0"/>
+              <a:t>Utilitarianism</a:t>
+            </a:r>
+            <a:endParaRPr lang="en-US" dirty="0"/>
+          </a:p>
+        </p:txBody>
+      </p:sp>
+      <p:sp>
+        <p:nvSpPr>
+          <p:cNvPr id="4" name="TextBox 3"/>
           <p:cNvSpPr txBox="1"/>
           <p:nvPr/>
         </p:nvSpPr>
         <p:spPr>
           <a:xfrm>
-            <a:off x="2871876" y="1873699"/>
-            <a:ext cx="5875583" cy="923330"/>
+            <a:off x="197922" y="1570733"/>
+            <a:ext cx="11994078" cy="2800767"/>
           </a:xfrm>
           <a:prstGeom prst="rect">
             <a:avLst/>
@@ -3999,42 +4334,73 @@
           <a:noFill/>
         </p:spPr>
         <p:txBody>
-          <a:bodyPr wrap="none" rtlCol="0">
+          <a:bodyPr wrap="square" rtlCol="0">
             <a:spAutoFit/>
           </a:bodyPr>
           <a:lstStyle/>
           <a:p>
             <a:r>
-              <a:rPr lang="en-US" sz="5400" smtClean="0">
-                <a:latin typeface="+mj-lt"/>
-              </a:rPr>
-              <a:t>2. </a:t>
-            </a:r>
-            <a:r>
-              <a:rPr lang="en-US" sz="5400" dirty="0" smtClean="0">
-                <a:latin typeface="+mj-lt"/>
-              </a:rPr>
-              <a:t>Deontology </a:t>
-            </a:r>
-            <a:r>
-              <a:rPr lang="en-US" sz="5400" dirty="0">
-                <a:latin typeface="+mj-lt"/>
-              </a:rPr>
-              <a:t>(Kant</a:t>
-            </a:r>
-            <a:r>
-              <a:rPr lang="en-US" sz="5400" dirty="0" smtClean="0">
-                <a:latin typeface="+mj-lt"/>
-              </a:rPr>
-              <a:t>)</a:t>
-            </a:r>
+              <a:rPr lang="en-US" sz="4400" b="1" dirty="0" smtClean="0">
+                <a:latin typeface="+mj-lt"/>
+              </a:rPr>
+              <a:t>Example</a:t>
+            </a:r>
+            <a:r>
+              <a:rPr lang="en-US" sz="4400" dirty="0" smtClean="0">
+                <a:latin typeface="+mj-lt"/>
+              </a:rPr>
+              <a:t>:  A surgeon has five dying patients who are each in urgent need of a different organ.  A homeless man walks into the hospital with all the organs necessary to save all five patients.</a:t>
+            </a:r>
+            <a:endParaRPr lang="en-US" sz="4400" dirty="0">
+              <a:latin typeface="+mj-lt"/>
+            </a:endParaRPr>
+          </a:p>
+        </p:txBody>
+      </p:sp>
+      <p:sp>
+        <p:nvSpPr>
+          <p:cNvPr id="11" name="TextBox 10"/>
+          <p:cNvSpPr txBox="1"/>
+          <p:nvPr/>
+        </p:nvSpPr>
+        <p:spPr>
+          <a:xfrm>
+            <a:off x="61383" y="4544142"/>
+            <a:ext cx="11994078" cy="2123658"/>
+          </a:xfrm>
+          <a:prstGeom prst="rect">
+            <a:avLst/>
+          </a:prstGeom>
+          <a:noFill/>
+        </p:spPr>
+        <p:txBody>
+          <a:bodyPr wrap="square" rtlCol="0">
+            <a:spAutoFit/>
+          </a:bodyPr>
+          <a:lstStyle/>
+          <a:p>
+            <a:r>
+              <a:rPr lang="en-US" sz="4400" b="1" dirty="0" smtClean="0">
+                <a:latin typeface="+mj-lt"/>
+              </a:rPr>
+              <a:t>Utilitarian answer</a:t>
+            </a:r>
+            <a:r>
+              <a:rPr lang="en-US" sz="4400" dirty="0" smtClean="0">
+                <a:latin typeface="+mj-lt"/>
+              </a:rPr>
+              <a:t>: Kill the homeless man to save the five.  It is four lives better than letting the five die and letting the homeless man live.</a:t>
+            </a:r>
+            <a:endParaRPr lang="en-US" sz="4400" dirty="0">
+              <a:latin typeface="+mj-lt"/>
+            </a:endParaRPr>
           </a:p>
         </p:txBody>
       </p:sp>
     </p:spTree>
     <p:extLst>
       <p:ext uri="{BB962C8B-B14F-4D97-AF65-F5344CB8AC3E}">
-        <p14:creationId xmlns:p14="http://schemas.microsoft.com/office/powerpoint/2010/main" val="327778704"/>
+        <p14:creationId xmlns:p14="http://schemas.microsoft.com/office/powerpoint/2010/main" val="163831469"/>
       </p:ext>
     </p:extLst>
   </p:cSld>
@@ -4043,10 +4409,10 @@
   </p:clrMapOvr>
   <mc:AlternateContent xmlns:mc="http://schemas.openxmlformats.org/markup-compatibility/2006" xmlns:p14="http://schemas.microsoft.com/office/powerpoint/2010/main">
     <mc:Choice Requires="p14">
-      <p:transition spd="slow" p14:dur="2000" advTm="7988"/>
+      <p:transition spd="slow" p14:dur="2000" advTm="4104"/>
     </mc:Choice>
     <mc:Fallback xmlns="">
-      <p:transition spd="slow" advTm="7988"/>
+      <p:transition spd="slow" advTm="4104"/>
     </mc:Fallback>
   </mc:AlternateContent>
   <p:timing>
@@ -4084,8 +4450,8 @@
         </p:nvSpPr>
         <p:spPr>
           <a:xfrm>
-            <a:off x="959948" y="175527"/>
-            <a:ext cx="10318594" cy="923330"/>
+            <a:off x="2871876" y="1873699"/>
+            <a:ext cx="5875583" cy="923330"/>
           </a:xfrm>
           <a:prstGeom prst="rect">
             <a:avLst/>
@@ -4099,39 +4465,36 @@
           <a:lstStyle/>
           <a:p>
             <a:r>
+              <a:rPr lang="en-US" sz="5400" smtClean="0">
+                <a:latin typeface="+mj-lt"/>
+              </a:rPr>
+              <a:t>2. </a:t>
+            </a:r>
+            <a:r>
               <a:rPr lang="en-US" sz="5400" dirty="0" smtClean="0">
                 <a:latin typeface="+mj-lt"/>
               </a:rPr>
-              <a:t>Kant</a:t>
+              <a:t>Deontology </a:t>
             </a:r>
             <a:r>
               <a:rPr lang="en-US" sz="5400" dirty="0">
                 <a:latin typeface="+mj-lt"/>
               </a:rPr>
-              <a:t> </a:t>
+              <a:t>(Kant</a:t>
             </a:r>
             <a:r>
               <a:rPr lang="en-US" sz="5400" dirty="0" smtClean="0">
                 <a:latin typeface="+mj-lt"/>
               </a:rPr>
-              <a:t>has two </a:t>
-            </a:r>
-            <a:r>
-              <a:rPr lang="en-US" sz="5400" u="sng" dirty="0" smtClean="0">
-                <a:latin typeface="+mj-lt"/>
-              </a:rPr>
-              <a:t>categorical imperatives</a:t>
-            </a:r>
-            <a:endParaRPr lang="en-US" sz="5400" dirty="0" smtClean="0">
-              <a:latin typeface="+mj-lt"/>
-            </a:endParaRPr>
+              <a:t>)</a:t>
+            </a:r>
           </a:p>
         </p:txBody>
       </p:sp>
     </p:spTree>
     <p:extLst>
       <p:ext uri="{BB962C8B-B14F-4D97-AF65-F5344CB8AC3E}">
-        <p14:creationId xmlns:p14="http://schemas.microsoft.com/office/powerpoint/2010/main" val="1694549136"/>
+        <p14:creationId xmlns:p14="http://schemas.microsoft.com/office/powerpoint/2010/main" val="327778704"/>
       </p:ext>
     </p:extLst>
   </p:cSld>
@@ -4225,45 +4588,10 @@
           </a:p>
         </p:txBody>
       </p:sp>
-      <p:sp>
-        <p:nvSpPr>
-          <p:cNvPr id="4" name="TextBox 3"/>
-          <p:cNvSpPr txBox="1"/>
-          <p:nvPr/>
-        </p:nvSpPr>
-        <p:spPr>
-          <a:xfrm>
-            <a:off x="557192" y="1527361"/>
-            <a:ext cx="10361193" cy="1446550"/>
-          </a:xfrm>
-          <a:prstGeom prst="rect">
-            <a:avLst/>
-          </a:prstGeom>
-          <a:noFill/>
-        </p:spPr>
-        <p:txBody>
-          <a:bodyPr wrap="square" rtlCol="0">
-            <a:spAutoFit/>
-          </a:bodyPr>
-          <a:lstStyle/>
-          <a:p>
-            <a:pPr algn="ctr"/>
-            <a:r>
-              <a:rPr lang="en-US" sz="4400" dirty="0" smtClean="0">
-                <a:latin typeface="+mj-lt"/>
-              </a:rPr>
-              <a:t>1. Act only on that maxim which you can at the same time will become universal law</a:t>
-            </a:r>
-            <a:endParaRPr lang="en-US" sz="4400" dirty="0">
-              <a:latin typeface="+mj-lt"/>
-            </a:endParaRPr>
-          </a:p>
-        </p:txBody>
-      </p:sp>
     </p:spTree>
     <p:extLst>
       <p:ext uri="{BB962C8B-B14F-4D97-AF65-F5344CB8AC3E}">
-        <p14:creationId xmlns:p14="http://schemas.microsoft.com/office/powerpoint/2010/main" val="1608921208"/>
+        <p14:creationId xmlns:p14="http://schemas.microsoft.com/office/powerpoint/2010/main" val="1694549136"/>
       </p:ext>
     </p:extLst>
   </p:cSld>
@@ -4392,51 +4720,10 @@
           </a:p>
         </p:txBody>
       </p:sp>
-      <p:sp>
-        <p:nvSpPr>
-          <p:cNvPr id="6" name="TextBox 5"/>
-          <p:cNvSpPr txBox="1"/>
-          <p:nvPr/>
-        </p:nvSpPr>
-        <p:spPr>
-          <a:xfrm>
-            <a:off x="709592" y="3508561"/>
-            <a:ext cx="10361193" cy="2123658"/>
-          </a:xfrm>
-          <a:prstGeom prst="rect">
-            <a:avLst/>
-          </a:prstGeom>
-          <a:noFill/>
-        </p:spPr>
-        <p:txBody>
-          <a:bodyPr wrap="square" rtlCol="0">
-            <a:spAutoFit/>
-          </a:bodyPr>
-          <a:lstStyle/>
-          <a:p>
-            <a:pPr algn="ctr"/>
-            <a:r>
-              <a:rPr lang="en-US" sz="4400" dirty="0">
-                <a:latin typeface="+mj-lt"/>
-              </a:rPr>
-              <a:t>2</a:t>
-            </a:r>
-            <a:r>
-              <a:rPr lang="en-US" sz="4400" dirty="0" smtClean="0">
-                <a:latin typeface="+mj-lt"/>
-              </a:rPr>
-              <a:t>. Always treat humanity, whether yourself or others, as an end and never as a mere means</a:t>
-            </a:r>
-            <a:endParaRPr lang="en-US" sz="4400" dirty="0">
-              <a:latin typeface="+mj-lt"/>
-            </a:endParaRPr>
-          </a:p>
-        </p:txBody>
-      </p:sp>
     </p:spTree>
     <p:extLst>
       <p:ext uri="{BB962C8B-B14F-4D97-AF65-F5344CB8AC3E}">
-        <p14:creationId xmlns:p14="http://schemas.microsoft.com/office/powerpoint/2010/main" val="24659832"/>
+        <p14:creationId xmlns:p14="http://schemas.microsoft.com/office/powerpoint/2010/main" val="1608921208"/>
       </p:ext>
     </p:extLst>
   </p:cSld>
@@ -4486,8 +4773,8 @@
         </p:nvSpPr>
         <p:spPr>
           <a:xfrm>
-            <a:off x="2271801" y="1559374"/>
-            <a:ext cx="7497630" cy="923330"/>
+            <a:off x="959948" y="175527"/>
+            <a:ext cx="10318594" cy="923330"/>
           </a:xfrm>
           <a:prstGeom prst="rect">
             <a:avLst/>
@@ -4504,27 +4791,112 @@
               <a:rPr lang="en-US" sz="5400" dirty="0" smtClean="0">
                 <a:latin typeface="+mj-lt"/>
               </a:rPr>
-              <a:t>3. Virtue Ethics (</a:t>
-            </a:r>
-            <a:r>
-              <a:rPr lang="en-US" sz="5400" dirty="0" err="1" smtClean="0">
-                <a:latin typeface="+mj-lt"/>
-              </a:rPr>
-              <a:t>Artistotle</a:t>
+              <a:t>Kant</a:t>
+            </a:r>
+            <a:r>
+              <a:rPr lang="en-US" sz="5400" dirty="0">
+                <a:latin typeface="+mj-lt"/>
+              </a:rPr>
+              <a:t> </a:t>
             </a:r>
             <a:r>
               <a:rPr lang="en-US" sz="5400" dirty="0" smtClean="0">
                 <a:latin typeface="+mj-lt"/>
               </a:rPr>
-              <a:t>)</a:t>
-            </a:r>
+              <a:t>has two </a:t>
+            </a:r>
+            <a:r>
+              <a:rPr lang="en-US" sz="5400" u="sng" dirty="0" smtClean="0">
+                <a:latin typeface="+mj-lt"/>
+              </a:rPr>
+              <a:t>categorical imperatives</a:t>
+            </a:r>
+            <a:endParaRPr lang="en-US" sz="5400" dirty="0" smtClean="0">
+              <a:latin typeface="+mj-lt"/>
+            </a:endParaRPr>
+          </a:p>
+        </p:txBody>
+      </p:sp>
+      <p:sp>
+        <p:nvSpPr>
+          <p:cNvPr id="4" name="TextBox 3"/>
+          <p:cNvSpPr txBox="1"/>
+          <p:nvPr/>
+        </p:nvSpPr>
+        <p:spPr>
+          <a:xfrm>
+            <a:off x="557192" y="1527361"/>
+            <a:ext cx="10361193" cy="1446550"/>
+          </a:xfrm>
+          <a:prstGeom prst="rect">
+            <a:avLst/>
+          </a:prstGeom>
+          <a:noFill/>
+        </p:spPr>
+        <p:txBody>
+          <a:bodyPr wrap="square" rtlCol="0">
+            <a:spAutoFit/>
+          </a:bodyPr>
+          <a:lstStyle/>
+          <a:p>
+            <a:pPr algn="ctr"/>
+            <a:r>
+              <a:rPr lang="en-US" sz="4400" dirty="0" smtClean="0">
+                <a:latin typeface="+mj-lt"/>
+              </a:rPr>
+              <a:t>1. Act only on that maxim which you can at the same time will become universal law</a:t>
+            </a:r>
+            <a:endParaRPr lang="en-US" sz="4400" dirty="0">
+              <a:latin typeface="+mj-lt"/>
+            </a:endParaRPr>
+          </a:p>
+        </p:txBody>
+      </p:sp>
+      <p:sp>
+        <p:nvSpPr>
+          <p:cNvPr id="6" name="TextBox 5"/>
+          <p:cNvSpPr txBox="1"/>
+          <p:nvPr/>
+        </p:nvSpPr>
+        <p:spPr>
+          <a:xfrm>
+            <a:off x="709592" y="3508561"/>
+            <a:ext cx="10361193" cy="2123658"/>
+          </a:xfrm>
+          <a:prstGeom prst="rect">
+            <a:avLst/>
+          </a:prstGeom>
+          <a:noFill/>
+        </p:spPr>
+        <p:txBody>
+          <a:bodyPr wrap="square" rtlCol="0">
+            <a:spAutoFit/>
+          </a:bodyPr>
+          <a:lstStyle/>
+          <a:p>
+            <a:pPr algn="ctr"/>
+            <a:r>
+              <a:rPr lang="en-US" sz="4400" dirty="0">
+                <a:latin typeface="+mj-lt"/>
+              </a:rPr>
+              <a:t>2</a:t>
+            </a:r>
+            <a:r>
+              <a:rPr lang="en-US" sz="4400" dirty="0" smtClean="0">
+                <a:latin typeface="+mj-lt"/>
+              </a:rPr>
+              <a:t>. Always treat humanity, whether yourself or others, as an end and never as a mere means</a:t>
+            </a:r>
+            <a:endParaRPr lang="en-US" sz="4400" dirty="0">
+              <a:latin typeface="+mj-lt"/>
+            </a:endParaRPr>
           </a:p>
         </p:txBody>
       </p:sp>
     </p:spTree>
     <p:extLst>
       <p:ext uri="{BB962C8B-B14F-4D97-AF65-F5344CB8AC3E}">
-        <p14:creationId xmlns:p14="http://schemas.microsoft.com/office/powerpoint/2010/main" val="1223396110"/>
+        <p14:creationId xmlns:p14="http://schemas.microsoft.com/office/powerpoint/2010/main" val="24659832"/>
       </p:ext>
     </p:extLst>
   </p:cSld>
@@ -4568,138 +4940,44 @@
       </p:grpSpPr>
       <p:sp>
         <p:nvSpPr>
-          <p:cNvPr id="2" name="Rectangle 1"/>
-          <p:cNvSpPr/>
-          <p:nvPr/>
-        </p:nvSpPr>
-        <p:spPr>
-          <a:xfrm>
-            <a:off x="3372152" y="2834728"/>
-            <a:ext cx="3882666" cy="3416320"/>
-          </a:xfrm>
-          <a:prstGeom prst="rect">
-            <a:avLst/>
-          </a:prstGeom>
-        </p:spPr>
-        <p:txBody>
-          <a:bodyPr wrap="none">
-            <a:spAutoFit/>
+          <p:cNvPr id="2" name="Title 1"/>
+          <p:cNvSpPr>
+            <a:spLocks noGrp="1"/>
+          </p:cNvSpPr>
+          <p:nvPr>
+            <p:ph type="ctrTitle"/>
+          </p:nvPr>
+        </p:nvSpPr>
+        <p:spPr>
+          <a:xfrm>
+            <a:off x="1486422" y="0"/>
+            <a:ext cx="9144000" cy="1085849"/>
+          </a:xfrm>
+        </p:spPr>
+        <p:txBody>
+          <a:bodyPr>
+            <a:normAutofit/>
           </a:bodyPr>
           <a:lstStyle/>
           <a:p>
-            <a:pPr marL="285750" indent="-285750">
-              <a:buFont typeface="Arial" charset="0"/>
-              <a:buChar char="•"/>
-            </a:pPr>
-            <a:r>
-              <a:rPr lang="en-US" sz="5400" dirty="0" smtClean="0">
-                <a:latin typeface="+mj-lt"/>
-              </a:rPr>
-              <a:t>Temperance</a:t>
-            </a:r>
-          </a:p>
-          <a:p>
-            <a:pPr marL="285750" indent="-285750">
-              <a:buFont typeface="Arial" charset="0"/>
-              <a:buChar char="•"/>
-            </a:pPr>
-            <a:r>
-              <a:rPr lang="en-US" sz="5400" dirty="0" smtClean="0">
-                <a:latin typeface="+mj-lt"/>
-              </a:rPr>
-              <a:t>Wisdom</a:t>
-            </a:r>
-          </a:p>
-          <a:p>
-            <a:pPr marL="285750" indent="-285750">
-              <a:buFont typeface="Arial" charset="0"/>
-              <a:buChar char="•"/>
-            </a:pPr>
-            <a:r>
-              <a:rPr lang="en-US" sz="5400" dirty="0" smtClean="0">
-                <a:latin typeface="+mj-lt"/>
-              </a:rPr>
-              <a:t>Justice</a:t>
-            </a:r>
-          </a:p>
-          <a:p>
-            <a:pPr marL="285750" indent="-285750">
-              <a:buFont typeface="Arial" charset="0"/>
-              <a:buChar char="•"/>
-            </a:pPr>
-            <a:r>
-              <a:rPr lang="en-US" sz="5400" dirty="0">
-                <a:latin typeface="+mj-lt"/>
-              </a:rPr>
-              <a:t>C</a:t>
-            </a:r>
-            <a:r>
-              <a:rPr lang="en-US" sz="5400" dirty="0" smtClean="0">
-                <a:latin typeface="+mj-lt"/>
-              </a:rPr>
-              <a:t>ourage</a:t>
-            </a:r>
-            <a:endParaRPr lang="en-US" sz="5400" dirty="0">
-              <a:latin typeface="+mj-lt"/>
-            </a:endParaRPr>
-          </a:p>
-        </p:txBody>
-      </p:sp>
-      <p:sp>
-        <p:nvSpPr>
-          <p:cNvPr id="7" name="Rectangle 6"/>
-          <p:cNvSpPr/>
-          <p:nvPr/>
-        </p:nvSpPr>
-        <p:spPr>
-          <a:xfrm>
-            <a:off x="385763" y="2146040"/>
-            <a:ext cx="10542561" cy="923330"/>
-          </a:xfrm>
-          <a:prstGeom prst="rect">
-            <a:avLst/>
-          </a:prstGeom>
-        </p:spPr>
-        <p:txBody>
-          <a:bodyPr wrap="square">
-            <a:spAutoFit/>
-          </a:bodyPr>
-          <a:lstStyle/>
-          <a:p>
-            <a:r>
-              <a:rPr lang="en-US" sz="5400" dirty="0" smtClean="0">
-                <a:latin typeface="+mj-lt"/>
-              </a:rPr>
-              <a:t>Aristotle’s four cardinal </a:t>
-            </a:r>
-            <a:r>
-              <a:rPr lang="en-US" sz="5400" dirty="0">
-                <a:latin typeface="+mj-lt"/>
-              </a:rPr>
-              <a:t>v</a:t>
-            </a:r>
-            <a:r>
-              <a:rPr lang="en-US" sz="5400" dirty="0" smtClean="0">
-                <a:latin typeface="+mj-lt"/>
-              </a:rPr>
-              <a:t>irtues:</a:t>
-            </a:r>
-            <a:endParaRPr lang="en-US" sz="5400" dirty="0">
-              <a:latin typeface="+mj-lt"/>
-            </a:endParaRPr>
-          </a:p>
-        </p:txBody>
-      </p:sp>
-      <p:sp>
-        <p:nvSpPr>
-          <p:cNvPr id="8" name="TextBox 7"/>
+            <a:r>
+              <a:rPr lang="en-US" smtClean="0"/>
+              <a:t>Kant</a:t>
+            </a:r>
+            <a:endParaRPr lang="en-US" dirty="0"/>
+          </a:p>
+        </p:txBody>
+      </p:sp>
+      <p:sp>
+        <p:nvSpPr>
+          <p:cNvPr id="4" name="TextBox 3"/>
           <p:cNvSpPr txBox="1"/>
           <p:nvPr/>
         </p:nvSpPr>
         <p:spPr>
           <a:xfrm>
-            <a:off x="57150" y="185052"/>
-            <a:ext cx="12192000" cy="923330"/>
+            <a:off x="197922" y="1085849"/>
+            <a:ext cx="11994078" cy="2800767"/>
           </a:xfrm>
           <a:prstGeom prst="rect">
             <a:avLst/>
@@ -4712,14 +4990,59 @@
           </a:bodyPr>
           <a:lstStyle/>
           <a:p>
-            <a:pPr algn="ctr"/>
-            <a:r>
-              <a:rPr lang="en-US" sz="5400" dirty="0" smtClean="0">
-                <a:latin typeface="+mj-lt"/>
-              </a:rPr>
-              <a:t>Virtue Ethics</a:t>
-            </a:r>
-            <a:endParaRPr lang="en-US" sz="5400" u="sng" dirty="0" smtClean="0">
+            <a:r>
+              <a:rPr lang="en-US" sz="4400" b="1" dirty="0" smtClean="0">
+                <a:latin typeface="+mj-lt"/>
+              </a:rPr>
+              <a:t>Example</a:t>
+            </a:r>
+            <a:r>
+              <a:rPr lang="en-US" sz="4400" dirty="0" smtClean="0">
+                <a:latin typeface="+mj-lt"/>
+              </a:rPr>
+              <a:t>:  A surgeon has five dying patients who are each in urgent need of a different organ.  A homeless man walks into the hospital with all the organs necessary to save all five patients.</a:t>
+            </a:r>
+            <a:endParaRPr lang="en-US" sz="4400" dirty="0">
+              <a:latin typeface="+mj-lt"/>
+            </a:endParaRPr>
+          </a:p>
+        </p:txBody>
+      </p:sp>
+      <p:sp>
+        <p:nvSpPr>
+          <p:cNvPr id="11" name="TextBox 10"/>
+          <p:cNvSpPr txBox="1"/>
+          <p:nvPr/>
+        </p:nvSpPr>
+        <p:spPr>
+          <a:xfrm>
+            <a:off x="197922" y="3910636"/>
+            <a:ext cx="11994078" cy="2800767"/>
+          </a:xfrm>
+          <a:prstGeom prst="rect">
+            <a:avLst/>
+          </a:prstGeom>
+          <a:noFill/>
+        </p:spPr>
+        <p:txBody>
+          <a:bodyPr wrap="square" rtlCol="0">
+            <a:spAutoFit/>
+          </a:bodyPr>
+          <a:lstStyle/>
+          <a:p>
+            <a:r>
+              <a:rPr lang="en-US" sz="4400" b="1" dirty="0" smtClean="0">
+                <a:latin typeface="+mj-lt"/>
+              </a:rPr>
+              <a:t>Kantian answer</a:t>
+            </a:r>
+            <a:r>
+              <a:rPr lang="en-US" sz="4400" dirty="0" smtClean="0">
+                <a:latin typeface="+mj-lt"/>
+              </a:rPr>
+              <a:t>: Do not kill the homeless man because it would be treating him as a means for saving others.  Also, it would not be a good universal law that surgeons may kill people for organs.</a:t>
+            </a:r>
+            <a:endParaRPr lang="en-US" sz="4400" dirty="0">
               <a:latin typeface="+mj-lt"/>
             </a:endParaRPr>
           </a:p>
@@ -4728,7 +5051,7 @@
     </p:spTree>
     <p:extLst>
       <p:ext uri="{BB962C8B-B14F-4D97-AF65-F5344CB8AC3E}">
-        <p14:creationId xmlns:p14="http://schemas.microsoft.com/office/powerpoint/2010/main" val="556164146"/>
+        <p14:creationId xmlns:p14="http://schemas.microsoft.com/office/powerpoint/2010/main" val="1352715114"/>
       </p:ext>
     </p:extLst>
   </p:cSld>
@@ -4737,10 +5060,10 @@
   </p:clrMapOvr>
   <mc:AlternateContent xmlns:mc="http://schemas.openxmlformats.org/markup-compatibility/2006" xmlns:p14="http://schemas.microsoft.com/office/powerpoint/2010/main">
     <mc:Choice Requires="p14">
-      <p:transition spd="slow" p14:dur="2000" advTm="7988"/>
+      <p:transition spd="slow" p14:dur="2000" advTm="4104"/>
     </mc:Choice>
     <mc:Fallback xmlns="">
-      <p:transition spd="slow" advTm="7988"/>
+      <p:transition spd="slow" advTm="4104"/>
     </mc:Fallback>
   </mc:AlternateContent>
   <p:timing>
@@ -4778,8 +5101,8 @@
         </p:nvSpPr>
         <p:spPr>
           <a:xfrm>
-            <a:off x="0" y="1404252"/>
-            <a:ext cx="12192000" cy="1754326"/>
+            <a:off x="2271801" y="1559374"/>
+            <a:ext cx="7497630" cy="923330"/>
           </a:xfrm>
           <a:prstGeom prst="rect">
             <a:avLst/>
@@ -4787,25 +5110,151 @@
           <a:noFill/>
         </p:spPr>
         <p:txBody>
-          <a:bodyPr wrap="square" rtlCol="0">
+          <a:bodyPr wrap="none" rtlCol="0">
             <a:spAutoFit/>
           </a:bodyPr>
           <a:lstStyle/>
           <a:p>
-            <a:pPr algn="ctr"/>
             <a:r>
               <a:rPr lang="en-US" sz="5400" dirty="0" smtClean="0">
                 <a:latin typeface="+mj-lt"/>
               </a:rPr>
-              <a:t>It is possible to have too much or too little </a:t>
-            </a:r>
-            <a:r>
-              <a:rPr lang="en-US" sz="5400" smtClean="0">
-                <a:latin typeface="+mj-lt"/>
-              </a:rPr>
-              <a:t>of each virtue (except justice).</a:t>
-            </a:r>
-            <a:endParaRPr lang="en-US" sz="5400" u="sng" dirty="0" smtClean="0">
+              <a:t>3. Virtue Ethics (</a:t>
+            </a:r>
+            <a:r>
+              <a:rPr lang="en-US" sz="5400" dirty="0" err="1" smtClean="0">
+                <a:latin typeface="+mj-lt"/>
+              </a:rPr>
+              <a:t>Artistotle</a:t>
+            </a:r>
+            <a:r>
+              <a:rPr lang="en-US" sz="5400" dirty="0" smtClean="0">
+                <a:latin typeface="+mj-lt"/>
+              </a:rPr>
+              <a:t>)</a:t>
+            </a:r>
+          </a:p>
+        </p:txBody>
+      </p:sp>
+    </p:spTree>
+    <p:extLst>
+      <p:ext uri="{BB962C8B-B14F-4D97-AF65-F5344CB8AC3E}">
+        <p14:creationId xmlns:p14="http://schemas.microsoft.com/office/powerpoint/2010/main" val="1223396110"/>
+      </p:ext>
+    </p:extLst>
+  </p:cSld>
+  <p:clrMapOvr>
+    <a:masterClrMapping/>
+  </p:clrMapOvr>
+  <mc:AlternateContent xmlns:mc="http://schemas.openxmlformats.org/markup-compatibility/2006" xmlns:p14="http://schemas.microsoft.com/office/powerpoint/2010/main">
+    <mc:Choice Requires="p14">
+      <p:transition spd="slow" p14:dur="2000" advTm="7988"/>
+    </mc:Choice>
+    <mc:Fallback xmlns="">
+      <p:transition spd="slow" advTm="7988"/>
+    </mc:Fallback>
+  </mc:AlternateContent>
+  <p:timing>
+    <p:tnLst>
+      <p:par>
+        <p:cTn id="1" dur="indefinite" restart="never" nodeType="tmRoot"/>
+      </p:par>
+    </p:tnLst>
+  </p:timing>
+</p:sld>
+</file>
+
+<file path=ppt/slides/slide19.xml><?xml version="1.0" encoding="utf-8"?>
+<p:sld xmlns:a="http://schemas.openxmlformats.org/drawingml/2006/main" xmlns:r="http://schemas.openxmlformats.org/officeDocument/2006/relationships" xmlns:p="http://schemas.openxmlformats.org/presentationml/2006/main">
+  <p:cSld>
+    <p:spTree>
+      <p:nvGrpSpPr>
+        <p:cNvPr id="1" name=""/>
+        <p:cNvGrpSpPr/>
+        <p:nvPr/>
+      </p:nvGrpSpPr>
+      <p:grpSpPr>
+        <a:xfrm>
+          <a:off x="0" y="0"/>
+          <a:ext cx="0" cy="0"/>
+          <a:chOff x="0" y="0"/>
+          <a:chExt cx="0" cy="0"/>
+        </a:xfrm>
+      </p:grpSpPr>
+      <p:sp>
+        <p:nvSpPr>
+          <p:cNvPr id="2" name="Rectangle 1"/>
+          <p:cNvSpPr/>
+          <p:nvPr/>
+        </p:nvSpPr>
+        <p:spPr>
+          <a:xfrm>
+            <a:off x="3372152" y="2834728"/>
+            <a:ext cx="3882666" cy="3416320"/>
+          </a:xfrm>
+          <a:prstGeom prst="rect">
+            <a:avLst/>
+          </a:prstGeom>
+        </p:spPr>
+        <p:txBody>
+          <a:bodyPr wrap="none">
+            <a:spAutoFit/>
+          </a:bodyPr>
+          <a:lstStyle/>
+          <a:p>
+            <a:pPr marL="285750" indent="-285750">
+              <a:buFont typeface="Arial" charset="0"/>
+              <a:buChar char="•"/>
+            </a:pPr>
+            <a:r>
+              <a:rPr lang="en-US" sz="5400" dirty="0" smtClean="0">
+                <a:latin typeface="+mj-lt"/>
+              </a:rPr>
+              <a:t>Temperance</a:t>
+            </a:r>
+          </a:p>
+          <a:p>
+            <a:pPr marL="285750" indent="-285750">
+              <a:buFont typeface="Arial" charset="0"/>
+              <a:buChar char="•"/>
+            </a:pPr>
+            <a:r>
+              <a:rPr lang="en-US" sz="5400" dirty="0" smtClean="0">
+                <a:latin typeface="+mj-lt"/>
+              </a:rPr>
+              <a:t>Wisdom</a:t>
+            </a:r>
+          </a:p>
+          <a:p>
+            <a:pPr marL="285750" indent="-285750">
+              <a:buFont typeface="Arial" charset="0"/>
+              <a:buChar char="•"/>
+            </a:pPr>
+            <a:r>
+              <a:rPr lang="en-US" sz="5400" dirty="0" smtClean="0">
+                <a:latin typeface="+mj-lt"/>
+              </a:rPr>
+              <a:t>Justice</a:t>
+            </a:r>
+          </a:p>
+          <a:p>
+            <a:pPr marL="285750" indent="-285750">
+              <a:buFont typeface="Arial" charset="0"/>
+              <a:buChar char="•"/>
+            </a:pPr>
+            <a:r>
+              <a:rPr lang="en-US" sz="5400" dirty="0">
+                <a:latin typeface="+mj-lt"/>
+              </a:rPr>
+              <a:t>C</a:t>
+            </a:r>
+            <a:r>
+              <a:rPr lang="en-US" sz="5400" dirty="0" smtClean="0">
+                <a:latin typeface="+mj-lt"/>
+              </a:rPr>
+              <a:t>ourage</a:t>
+            </a:r>
+            <a:endParaRPr lang="en-US" sz="5400" dirty="0">
               <a:latin typeface="+mj-lt"/>
             </a:endParaRPr>
           </a:p>
@@ -4813,14 +5262,59 @@
       </p:sp>
       <p:sp>
         <p:nvSpPr>
-          <p:cNvPr id="6" name="TextBox 5"/>
+          <p:cNvPr id="7" name="Rectangle 6"/>
+          <p:cNvSpPr/>
+          <p:nvPr/>
+        </p:nvSpPr>
+        <p:spPr>
+          <a:xfrm>
+            <a:off x="385763" y="2146040"/>
+            <a:ext cx="10542561" cy="923330"/>
+          </a:xfrm>
+          <a:prstGeom prst="rect">
+            <a:avLst/>
+          </a:prstGeom>
+        </p:spPr>
+        <p:txBody>
+          <a:bodyPr wrap="square">
+            <a:spAutoFit/>
+          </a:bodyPr>
+          <a:lstStyle/>
+          <a:p>
+            <a:r>
+              <a:rPr lang="en-US" sz="5400" dirty="0" smtClean="0">
+                <a:latin typeface="+mj-lt"/>
+              </a:rPr>
+              <a:t>Aristotle’s four cardinal </a:t>
+            </a:r>
+            <a:r>
+              <a:rPr lang="en-US" sz="5400" dirty="0">
+                <a:latin typeface="+mj-lt"/>
+              </a:rPr>
+              <a:t>v</a:t>
+            </a:r>
+            <a:r>
+              <a:rPr lang="en-US" sz="5400" dirty="0" smtClean="0">
+                <a:latin typeface="+mj-lt"/>
+              </a:rPr>
+              <a:t>irtues:</a:t>
+            </a:r>
+            <a:endParaRPr lang="en-US" sz="5400" dirty="0">
+              <a:latin typeface="+mj-lt"/>
+            </a:endParaRPr>
+          </a:p>
+        </p:txBody>
+      </p:sp>
+      <p:sp>
+        <p:nvSpPr>
+          <p:cNvPr id="8" name="TextBox 7"/>
           <p:cNvSpPr txBox="1"/>
           <p:nvPr/>
         </p:nvSpPr>
         <p:spPr>
           <a:xfrm>
-            <a:off x="57150" y="3842653"/>
-            <a:ext cx="12077700" cy="1754326"/>
+            <a:off x="57150" y="185052"/>
+            <a:ext cx="12192000" cy="923330"/>
           </a:xfrm>
           <a:prstGeom prst="rect">
             <a:avLst/>
@@ -4838,53 +5332,6 @@
               <a:rPr lang="en-US" sz="5400" dirty="0" smtClean="0">
                 <a:latin typeface="+mj-lt"/>
               </a:rPr>
-              <a:t>The target value of a virtue is </a:t>
-            </a:r>
-          </a:p>
-          <a:p>
-            <a:pPr algn="ctr"/>
-            <a:r>
-              <a:rPr lang="en-US" sz="5400" dirty="0" smtClean="0">
-                <a:latin typeface="+mj-lt"/>
-              </a:rPr>
-              <a:t>the </a:t>
-            </a:r>
-            <a:r>
-              <a:rPr lang="en-US" sz="5400" u="sng" dirty="0" smtClean="0">
-                <a:latin typeface="+mj-lt"/>
-              </a:rPr>
-              <a:t>golden mean</a:t>
-            </a:r>
-          </a:p>
-        </p:txBody>
-      </p:sp>
-      <p:sp>
-        <p:nvSpPr>
-          <p:cNvPr id="8" name="TextBox 7"/>
-          <p:cNvSpPr txBox="1"/>
-          <p:nvPr/>
-        </p:nvSpPr>
-        <p:spPr>
-          <a:xfrm>
-            <a:off x="57150" y="185052"/>
-            <a:ext cx="12192000" cy="923330"/>
-          </a:xfrm>
-          <a:prstGeom prst="rect">
-            <a:avLst/>
-          </a:prstGeom>
-          <a:noFill/>
-        </p:spPr>
-        <p:txBody>
-          <a:bodyPr wrap="square" rtlCol="0">
-            <a:spAutoFit/>
-          </a:bodyPr>
-          <a:lstStyle/>
-          <a:p>
-            <a:pPr algn="ctr"/>
-            <a:r>
-              <a:rPr lang="en-US" sz="5400" dirty="0" smtClean="0">
-                <a:latin typeface="+mj-lt"/>
-              </a:rPr>
               <a:t>Virtue Ethics</a:t>
             </a:r>
             <a:endParaRPr lang="en-US" sz="5400" u="sng" dirty="0" smtClean="0">
@@ -4896,7 +5343,7 @@
     </p:spTree>
     <p:extLst>
       <p:ext uri="{BB962C8B-B14F-4D97-AF65-F5344CB8AC3E}">
-        <p14:creationId xmlns:p14="http://schemas.microsoft.com/office/powerpoint/2010/main" val="1652132902"/>
+        <p14:creationId xmlns:p14="http://schemas.microsoft.com/office/powerpoint/2010/main" val="556164146"/>
       </p:ext>
     </p:extLst>
   </p:cSld>
@@ -5138,6 +5585,617 @@
             </p:audio>
           </p:childTnLst>
         </p:cTn>
+      </p:par>
+    </p:tnLst>
+  </p:timing>
+</p:sld>
+</file>
+
+<file path=ppt/slides/slide20.xml><?xml version="1.0" encoding="utf-8"?>
+<p:sld xmlns:a="http://schemas.openxmlformats.org/drawingml/2006/main" xmlns:r="http://schemas.openxmlformats.org/officeDocument/2006/relationships" xmlns:p="http://schemas.openxmlformats.org/presentationml/2006/main">
+  <p:cSld>
+    <p:spTree>
+      <p:nvGrpSpPr>
+        <p:cNvPr id="1" name=""/>
+        <p:cNvGrpSpPr/>
+        <p:nvPr/>
+      </p:nvGrpSpPr>
+      <p:grpSpPr>
+        <a:xfrm>
+          <a:off x="0" y="0"/>
+          <a:ext cx="0" cy="0"/>
+          <a:chOff x="0" y="0"/>
+          <a:chExt cx="0" cy="0"/>
+        </a:xfrm>
+      </p:grpSpPr>
+      <p:sp>
+        <p:nvSpPr>
+          <p:cNvPr id="5" name="TextBox 4"/>
+          <p:cNvSpPr txBox="1"/>
+          <p:nvPr/>
+        </p:nvSpPr>
+        <p:spPr>
+          <a:xfrm>
+            <a:off x="0" y="1404252"/>
+            <a:ext cx="12192000" cy="1754326"/>
+          </a:xfrm>
+          <a:prstGeom prst="rect">
+            <a:avLst/>
+          </a:prstGeom>
+          <a:noFill/>
+        </p:spPr>
+        <p:txBody>
+          <a:bodyPr wrap="square" rtlCol="0">
+            <a:spAutoFit/>
+          </a:bodyPr>
+          <a:lstStyle/>
+          <a:p>
+            <a:pPr algn="ctr"/>
+            <a:r>
+              <a:rPr lang="en-US" sz="5400" dirty="0" smtClean="0">
+                <a:latin typeface="+mj-lt"/>
+              </a:rPr>
+              <a:t>It is possible to have too much or too little </a:t>
+            </a:r>
+            <a:r>
+              <a:rPr lang="en-US" sz="5400" smtClean="0">
+                <a:latin typeface="+mj-lt"/>
+              </a:rPr>
+              <a:t>of each virtue (except justice).</a:t>
+            </a:r>
+            <a:endParaRPr lang="en-US" sz="5400" u="sng" dirty="0" smtClean="0">
+              <a:latin typeface="+mj-lt"/>
+            </a:endParaRPr>
+          </a:p>
+        </p:txBody>
+      </p:sp>
+      <p:sp>
+        <p:nvSpPr>
+          <p:cNvPr id="6" name="TextBox 5"/>
+          <p:cNvSpPr txBox="1"/>
+          <p:nvPr/>
+        </p:nvSpPr>
+        <p:spPr>
+          <a:xfrm>
+            <a:off x="57150" y="3842653"/>
+            <a:ext cx="12077700" cy="1754326"/>
+          </a:xfrm>
+          <a:prstGeom prst="rect">
+            <a:avLst/>
+          </a:prstGeom>
+          <a:noFill/>
+        </p:spPr>
+        <p:txBody>
+          <a:bodyPr wrap="square" rtlCol="0">
+            <a:spAutoFit/>
+          </a:bodyPr>
+          <a:lstStyle/>
+          <a:p>
+            <a:pPr algn="ctr"/>
+            <a:r>
+              <a:rPr lang="en-US" sz="5400" dirty="0" smtClean="0">
+                <a:latin typeface="+mj-lt"/>
+              </a:rPr>
+              <a:t>The target value of a virtue is </a:t>
+            </a:r>
+          </a:p>
+          <a:p>
+            <a:pPr algn="ctr"/>
+            <a:r>
+              <a:rPr lang="en-US" sz="5400" dirty="0" smtClean="0">
+                <a:latin typeface="+mj-lt"/>
+              </a:rPr>
+              <a:t>the </a:t>
+            </a:r>
+            <a:r>
+              <a:rPr lang="en-US" sz="5400" u="sng" dirty="0" smtClean="0">
+                <a:latin typeface="+mj-lt"/>
+              </a:rPr>
+              <a:t>golden mean</a:t>
+            </a:r>
+          </a:p>
+        </p:txBody>
+      </p:sp>
+      <p:sp>
+        <p:nvSpPr>
+          <p:cNvPr id="8" name="TextBox 7"/>
+          <p:cNvSpPr txBox="1"/>
+          <p:nvPr/>
+        </p:nvSpPr>
+        <p:spPr>
+          <a:xfrm>
+            <a:off x="57150" y="185052"/>
+            <a:ext cx="12192000" cy="923330"/>
+          </a:xfrm>
+          <a:prstGeom prst="rect">
+            <a:avLst/>
+          </a:prstGeom>
+          <a:noFill/>
+        </p:spPr>
+        <p:txBody>
+          <a:bodyPr wrap="square" rtlCol="0">
+            <a:spAutoFit/>
+          </a:bodyPr>
+          <a:lstStyle/>
+          <a:p>
+            <a:pPr algn="ctr"/>
+            <a:r>
+              <a:rPr lang="en-US" sz="5400" dirty="0" smtClean="0">
+                <a:latin typeface="+mj-lt"/>
+              </a:rPr>
+              <a:t>Virtue Ethics</a:t>
+            </a:r>
+            <a:endParaRPr lang="en-US" sz="5400" u="sng" dirty="0" smtClean="0">
+              <a:latin typeface="+mj-lt"/>
+            </a:endParaRPr>
+          </a:p>
+        </p:txBody>
+      </p:sp>
+    </p:spTree>
+    <p:extLst>
+      <p:ext uri="{BB962C8B-B14F-4D97-AF65-F5344CB8AC3E}">
+        <p14:creationId xmlns:p14="http://schemas.microsoft.com/office/powerpoint/2010/main" val="1652132902"/>
+      </p:ext>
+    </p:extLst>
+  </p:cSld>
+  <p:clrMapOvr>
+    <a:masterClrMapping/>
+  </p:clrMapOvr>
+  <mc:AlternateContent xmlns:mc="http://schemas.openxmlformats.org/markup-compatibility/2006" xmlns:p14="http://schemas.microsoft.com/office/powerpoint/2010/main">
+    <mc:Choice Requires="p14">
+      <p:transition spd="slow" p14:dur="2000" advTm="7988"/>
+    </mc:Choice>
+    <mc:Fallback xmlns="">
+      <p:transition spd="slow" advTm="7988"/>
+    </mc:Fallback>
+  </mc:AlternateContent>
+  <p:timing>
+    <p:tnLst>
+      <p:par>
+        <p:cTn id="1" dur="indefinite" restart="never" nodeType="tmRoot"/>
+      </p:par>
+    </p:tnLst>
+  </p:timing>
+</p:sld>
+</file>
+
+<file path=ppt/slides/slide21.xml><?xml version="1.0" encoding="utf-8"?>
+<p:sld xmlns:a="http://schemas.openxmlformats.org/drawingml/2006/main" xmlns:r="http://schemas.openxmlformats.org/officeDocument/2006/relationships" xmlns:p="http://schemas.openxmlformats.org/presentationml/2006/main">
+  <p:cSld>
+    <p:spTree>
+      <p:nvGrpSpPr>
+        <p:cNvPr id="1" name=""/>
+        <p:cNvGrpSpPr/>
+        <p:nvPr/>
+      </p:nvGrpSpPr>
+      <p:grpSpPr>
+        <a:xfrm>
+          <a:off x="0" y="0"/>
+          <a:ext cx="0" cy="0"/>
+          <a:chOff x="0" y="0"/>
+          <a:chExt cx="0" cy="0"/>
+        </a:xfrm>
+      </p:grpSpPr>
+      <p:sp>
+        <p:nvSpPr>
+          <p:cNvPr id="4" name="TextBox 3"/>
+          <p:cNvSpPr txBox="1"/>
+          <p:nvPr/>
+        </p:nvSpPr>
+        <p:spPr>
+          <a:xfrm>
+            <a:off x="197922" y="1085849"/>
+            <a:ext cx="11994078" cy="2800767"/>
+          </a:xfrm>
+          <a:prstGeom prst="rect">
+            <a:avLst/>
+          </a:prstGeom>
+          <a:noFill/>
+        </p:spPr>
+        <p:txBody>
+          <a:bodyPr wrap="square" rtlCol="0">
+            <a:spAutoFit/>
+          </a:bodyPr>
+          <a:lstStyle/>
+          <a:p>
+            <a:r>
+              <a:rPr lang="en-US" sz="4400" b="1" dirty="0" smtClean="0">
+                <a:latin typeface="+mj-lt"/>
+              </a:rPr>
+              <a:t>Example</a:t>
+            </a:r>
+            <a:r>
+              <a:rPr lang="en-US" sz="4400" dirty="0" smtClean="0">
+                <a:latin typeface="+mj-lt"/>
+              </a:rPr>
+              <a:t>:  A surgeon has five dying patients who are each in urgent need of a different organ.  A homeless man walks into the hospital with all the organs necessary to save all five patients.</a:t>
+            </a:r>
+            <a:endParaRPr lang="en-US" sz="4400" dirty="0">
+              <a:latin typeface="+mj-lt"/>
+            </a:endParaRPr>
+          </a:p>
+        </p:txBody>
+      </p:sp>
+      <p:sp>
+        <p:nvSpPr>
+          <p:cNvPr id="11" name="TextBox 10"/>
+          <p:cNvSpPr txBox="1"/>
+          <p:nvPr/>
+        </p:nvSpPr>
+        <p:spPr>
+          <a:xfrm>
+            <a:off x="197922" y="3910636"/>
+            <a:ext cx="11994078" cy="2800767"/>
+          </a:xfrm>
+          <a:prstGeom prst="rect">
+            <a:avLst/>
+          </a:prstGeom>
+          <a:noFill/>
+        </p:spPr>
+        <p:txBody>
+          <a:bodyPr wrap="square" rtlCol="0">
+            <a:spAutoFit/>
+          </a:bodyPr>
+          <a:lstStyle/>
+          <a:p>
+            <a:r>
+              <a:rPr lang="en-US" sz="4400" b="1" dirty="0" smtClean="0">
+                <a:latin typeface="+mj-lt"/>
+              </a:rPr>
+              <a:t>Virtue Ethics answer</a:t>
+            </a:r>
+            <a:r>
+              <a:rPr lang="en-US" sz="4400" dirty="0" smtClean="0">
+                <a:latin typeface="+mj-lt"/>
+              </a:rPr>
+              <a:t>: Unclear.</a:t>
+            </a:r>
+          </a:p>
+          <a:p>
+            <a:r>
+              <a:rPr lang="en-US" sz="4400" dirty="0" smtClean="0">
+                <a:latin typeface="+mj-lt"/>
+              </a:rPr>
+              <a:t>Chopping up the homeless man would exhibit courage, but not chopping up the homeless man would exhibit temperance.</a:t>
+            </a:r>
+            <a:endParaRPr lang="en-US" sz="4400" dirty="0">
+              <a:latin typeface="+mj-lt"/>
+            </a:endParaRPr>
+          </a:p>
+        </p:txBody>
+      </p:sp>
+      <p:sp>
+        <p:nvSpPr>
+          <p:cNvPr id="6" name="TextBox 5"/>
+          <p:cNvSpPr txBox="1"/>
+          <p:nvPr/>
+        </p:nvSpPr>
+        <p:spPr>
+          <a:xfrm>
+            <a:off x="57150" y="185052"/>
+            <a:ext cx="12192000" cy="923330"/>
+          </a:xfrm>
+          <a:prstGeom prst="rect">
+            <a:avLst/>
+          </a:prstGeom>
+          <a:noFill/>
+        </p:spPr>
+        <p:txBody>
+          <a:bodyPr wrap="square" rtlCol="0">
+            <a:spAutoFit/>
+          </a:bodyPr>
+          <a:lstStyle/>
+          <a:p>
+            <a:pPr algn="ctr"/>
+            <a:r>
+              <a:rPr lang="en-US" sz="5400" dirty="0" smtClean="0">
+                <a:latin typeface="+mj-lt"/>
+              </a:rPr>
+              <a:t>Virtue Ethics</a:t>
+            </a:r>
+            <a:endParaRPr lang="en-US" sz="5400" u="sng" dirty="0" smtClean="0">
+              <a:latin typeface="+mj-lt"/>
+            </a:endParaRPr>
+          </a:p>
+        </p:txBody>
+      </p:sp>
+    </p:spTree>
+    <p:extLst>
+      <p:ext uri="{BB962C8B-B14F-4D97-AF65-F5344CB8AC3E}">
+        <p14:creationId xmlns:p14="http://schemas.microsoft.com/office/powerpoint/2010/main" val="598095061"/>
+      </p:ext>
+    </p:extLst>
+  </p:cSld>
+  <p:clrMapOvr>
+    <a:masterClrMapping/>
+  </p:clrMapOvr>
+  <mc:AlternateContent xmlns:mc="http://schemas.openxmlformats.org/markup-compatibility/2006" xmlns:p14="http://schemas.microsoft.com/office/powerpoint/2010/main">
+    <mc:Choice Requires="p14">
+      <p:transition spd="slow" p14:dur="2000" advTm="4104"/>
+    </mc:Choice>
+    <mc:Fallback xmlns="">
+      <p:transition spd="slow" advTm="4104"/>
+    </mc:Fallback>
+  </mc:AlternateContent>
+  <p:timing>
+    <p:tnLst>
+      <p:par>
+        <p:cTn id="1" dur="indefinite" restart="never" nodeType="tmRoot"/>
+      </p:par>
+    </p:tnLst>
+  </p:timing>
+</p:sld>
+</file>
+
+<file path=ppt/slides/slide22.xml><?xml version="1.0" encoding="utf-8"?>
+<p:sld xmlns:a="http://schemas.openxmlformats.org/drawingml/2006/main" xmlns:r="http://schemas.openxmlformats.org/officeDocument/2006/relationships" xmlns:p="http://schemas.openxmlformats.org/presentationml/2006/main">
+  <p:cSld>
+    <p:spTree>
+      <p:nvGrpSpPr>
+        <p:cNvPr id="1" name=""/>
+        <p:cNvGrpSpPr/>
+        <p:nvPr/>
+      </p:nvGrpSpPr>
+      <p:grpSpPr>
+        <a:xfrm>
+          <a:off x="0" y="0"/>
+          <a:ext cx="0" cy="0"/>
+          <a:chOff x="0" y="0"/>
+          <a:chExt cx="0" cy="0"/>
+        </a:xfrm>
+      </p:grpSpPr>
+      <p:sp>
+        <p:nvSpPr>
+          <p:cNvPr id="6" name="TextBox 5"/>
+          <p:cNvSpPr txBox="1"/>
+          <p:nvPr/>
+        </p:nvSpPr>
+        <p:spPr>
+          <a:xfrm>
+            <a:off x="1516856" y="2485340"/>
+            <a:ext cx="9272587" cy="1754326"/>
+          </a:xfrm>
+          <a:prstGeom prst="rect">
+            <a:avLst/>
+          </a:prstGeom>
+          <a:noFill/>
+        </p:spPr>
+        <p:txBody>
+          <a:bodyPr wrap="square" rtlCol="0">
+            <a:spAutoFit/>
+          </a:bodyPr>
+          <a:lstStyle/>
+          <a:p>
+            <a:pPr algn="ctr"/>
+            <a:r>
+              <a:rPr lang="en-US" sz="5400" dirty="0" smtClean="0">
+                <a:latin typeface="+mj-lt"/>
+              </a:rPr>
+              <a:t>Something is good if it is doing its function well</a:t>
+            </a:r>
+            <a:endParaRPr lang="en-US" sz="5400" dirty="0" smtClean="0">
+              <a:latin typeface="+mj-lt"/>
+            </a:endParaRPr>
+          </a:p>
+        </p:txBody>
+      </p:sp>
+      <p:sp>
+        <p:nvSpPr>
+          <p:cNvPr id="8" name="TextBox 7"/>
+          <p:cNvSpPr txBox="1"/>
+          <p:nvPr/>
+        </p:nvSpPr>
+        <p:spPr>
+          <a:xfrm>
+            <a:off x="57150" y="185052"/>
+            <a:ext cx="12192000" cy="923330"/>
+          </a:xfrm>
+          <a:prstGeom prst="rect">
+            <a:avLst/>
+          </a:prstGeom>
+          <a:noFill/>
+        </p:spPr>
+        <p:txBody>
+          <a:bodyPr wrap="square" rtlCol="0">
+            <a:spAutoFit/>
+          </a:bodyPr>
+          <a:lstStyle/>
+          <a:p>
+            <a:pPr algn="ctr"/>
+            <a:r>
+              <a:rPr lang="en-US" sz="5400" dirty="0" smtClean="0">
+                <a:latin typeface="+mj-lt"/>
+              </a:rPr>
+              <a:t>Aristotle’s function argument</a:t>
+            </a:r>
+            <a:endParaRPr lang="en-US" sz="5400" u="sng" dirty="0" smtClean="0">
+              <a:latin typeface="+mj-lt"/>
+            </a:endParaRPr>
+          </a:p>
+        </p:txBody>
+      </p:sp>
+    </p:spTree>
+    <p:extLst>
+      <p:ext uri="{BB962C8B-B14F-4D97-AF65-F5344CB8AC3E}">
+        <p14:creationId xmlns:p14="http://schemas.microsoft.com/office/powerpoint/2010/main" val="770057319"/>
+      </p:ext>
+    </p:extLst>
+  </p:cSld>
+  <p:clrMapOvr>
+    <a:masterClrMapping/>
+  </p:clrMapOvr>
+  <mc:AlternateContent xmlns:mc="http://schemas.openxmlformats.org/markup-compatibility/2006" xmlns:p14="http://schemas.microsoft.com/office/powerpoint/2010/main">
+    <mc:Choice Requires="p14">
+      <p:transition spd="slow" p14:dur="2000" advTm="7988"/>
+    </mc:Choice>
+    <mc:Fallback xmlns="">
+      <p:transition spd="slow" advTm="7988"/>
+    </mc:Fallback>
+  </mc:AlternateContent>
+  <p:timing>
+    <p:tnLst>
+      <p:par>
+        <p:cTn id="1" dur="indefinite" restart="never" nodeType="tmRoot"/>
+      </p:par>
+    </p:tnLst>
+  </p:timing>
+</p:sld>
+</file>
+
+<file path=ppt/slides/slide23.xml><?xml version="1.0" encoding="utf-8"?>
+<p:sld xmlns:a="http://schemas.openxmlformats.org/drawingml/2006/main" xmlns:r="http://schemas.openxmlformats.org/officeDocument/2006/relationships" xmlns:p="http://schemas.openxmlformats.org/presentationml/2006/main">
+  <p:cSld>
+    <p:spTree>
+      <p:nvGrpSpPr>
+        <p:cNvPr id="1" name=""/>
+        <p:cNvGrpSpPr/>
+        <p:nvPr/>
+      </p:nvGrpSpPr>
+      <p:grpSpPr>
+        <a:xfrm>
+          <a:off x="0" y="0"/>
+          <a:ext cx="0" cy="0"/>
+          <a:chOff x="0" y="0"/>
+          <a:chExt cx="0" cy="0"/>
+        </a:xfrm>
+      </p:grpSpPr>
+      <p:sp>
+        <p:nvSpPr>
+          <p:cNvPr id="4" name="TextBox 3"/>
+          <p:cNvSpPr txBox="1"/>
+          <p:nvPr/>
+        </p:nvSpPr>
+        <p:spPr>
+          <a:xfrm>
+            <a:off x="197922" y="1085849"/>
+            <a:ext cx="11994078" cy="2800767"/>
+          </a:xfrm>
+          <a:prstGeom prst="rect">
+            <a:avLst/>
+          </a:prstGeom>
+          <a:noFill/>
+        </p:spPr>
+        <p:txBody>
+          <a:bodyPr wrap="square" rtlCol="0">
+            <a:spAutoFit/>
+          </a:bodyPr>
+          <a:lstStyle/>
+          <a:p>
+            <a:r>
+              <a:rPr lang="en-US" sz="4400" b="1" dirty="0" smtClean="0">
+                <a:latin typeface="+mj-lt"/>
+              </a:rPr>
+              <a:t>Example</a:t>
+            </a:r>
+            <a:r>
+              <a:rPr lang="en-US" sz="4400" dirty="0" smtClean="0">
+                <a:latin typeface="+mj-lt"/>
+              </a:rPr>
+              <a:t>:  A surgeon has five dying patients who are each in urgent need of a different organ.  A homeless man walks into the hospital with all the organs necessary to save all five patients.</a:t>
+            </a:r>
+            <a:endParaRPr lang="en-US" sz="4400" dirty="0">
+              <a:latin typeface="+mj-lt"/>
+            </a:endParaRPr>
+          </a:p>
+        </p:txBody>
+      </p:sp>
+      <p:sp>
+        <p:nvSpPr>
+          <p:cNvPr id="11" name="TextBox 10"/>
+          <p:cNvSpPr txBox="1"/>
+          <p:nvPr/>
+        </p:nvSpPr>
+        <p:spPr>
+          <a:xfrm>
+            <a:off x="197922" y="3910636"/>
+            <a:ext cx="11994078" cy="2123658"/>
+          </a:xfrm>
+          <a:prstGeom prst="rect">
+            <a:avLst/>
+          </a:prstGeom>
+          <a:noFill/>
+        </p:spPr>
+        <p:txBody>
+          <a:bodyPr wrap="square" rtlCol="0">
+            <a:spAutoFit/>
+          </a:bodyPr>
+          <a:lstStyle/>
+          <a:p>
+            <a:r>
+              <a:rPr lang="en-US" sz="4400" b="1" dirty="0" smtClean="0">
+                <a:latin typeface="+mj-lt"/>
+              </a:rPr>
+              <a:t>Function argument answer</a:t>
+            </a:r>
+            <a:r>
+              <a:rPr lang="en-US" sz="4400" dirty="0" smtClean="0">
+                <a:latin typeface="+mj-lt"/>
+              </a:rPr>
+              <a:t>: Chop up the homeless man because that would be doing the function of a surgeon well.</a:t>
+            </a:r>
+            <a:endParaRPr lang="en-US" sz="4400" dirty="0">
+              <a:latin typeface="+mj-lt"/>
+            </a:endParaRPr>
+          </a:p>
+        </p:txBody>
+      </p:sp>
+      <p:sp>
+        <p:nvSpPr>
+          <p:cNvPr id="6" name="TextBox 5"/>
+          <p:cNvSpPr txBox="1"/>
+          <p:nvPr/>
+        </p:nvSpPr>
+        <p:spPr>
+          <a:xfrm>
+            <a:off x="57150" y="185052"/>
+            <a:ext cx="12192000" cy="923330"/>
+          </a:xfrm>
+          <a:prstGeom prst="rect">
+            <a:avLst/>
+          </a:prstGeom>
+          <a:noFill/>
+        </p:spPr>
+        <p:txBody>
+          <a:bodyPr wrap="square" rtlCol="0">
+            <a:spAutoFit/>
+          </a:bodyPr>
+          <a:lstStyle/>
+          <a:p>
+            <a:pPr algn="ctr"/>
+            <a:r>
+              <a:rPr lang="en-US" sz="5400" dirty="0" smtClean="0">
+                <a:latin typeface="+mj-lt"/>
+              </a:rPr>
+              <a:t>Function Argument</a:t>
+            </a:r>
+            <a:endParaRPr lang="en-US" sz="5400" u="sng" dirty="0" smtClean="0">
+              <a:latin typeface="+mj-lt"/>
+            </a:endParaRPr>
+          </a:p>
+        </p:txBody>
+      </p:sp>
+    </p:spTree>
+    <p:extLst>
+      <p:ext uri="{BB962C8B-B14F-4D97-AF65-F5344CB8AC3E}">
+        <p14:creationId xmlns:p14="http://schemas.microsoft.com/office/powerpoint/2010/main" val="1440558009"/>
+      </p:ext>
+    </p:extLst>
+  </p:cSld>
+  <p:clrMapOvr>
+    <a:masterClrMapping/>
+  </p:clrMapOvr>
+  <mc:AlternateContent xmlns:mc="http://schemas.openxmlformats.org/markup-compatibility/2006" xmlns:p14="http://schemas.microsoft.com/office/powerpoint/2010/main">
+    <mc:Choice Requires="p14">
+      <p:transition spd="slow" p14:dur="2000" advTm="4104"/>
+    </mc:Choice>
+    <mc:Fallback xmlns="">
+      <p:transition spd="slow" advTm="4104"/>
+    </mc:Fallback>
+  </mc:AlternateContent>
+  <p:timing>
+    <p:tnLst>
+      <p:par>
+        <p:cTn id="1" dur="indefinite" restart="never" nodeType="tmRoot"/>
       </p:par>
     </p:tnLst>
   </p:timing>
@@ -6431,8 +7489,8 @@
         </p:nvSpPr>
         <p:spPr>
           <a:xfrm>
-            <a:off x="970849" y="3176053"/>
-            <a:ext cx="10361193" cy="1446550"/>
+            <a:off x="606156" y="3187929"/>
+            <a:ext cx="10904530" cy="769441"/>
           </a:xfrm>
           <a:prstGeom prst="rect">
             <a:avLst/>
@@ -6447,28 +7505,40 @@
           <a:p>
             <a:pPr algn="ctr"/>
             <a:r>
-              <a:rPr lang="en-US" sz="4400" u="sng" dirty="0" smtClean="0">
+              <a:rPr lang="en-US" sz="4400" u="sng" smtClean="0">
                 <a:latin typeface="+mj-lt"/>
               </a:rPr>
               <a:t>happiness</a:t>
             </a:r>
             <a:r>
+              <a:rPr lang="en-US" sz="4400" smtClean="0">
+                <a:latin typeface="+mj-lt"/>
+              </a:rPr>
+              <a:t> </a:t>
+            </a:r>
+            <a:r>
+              <a:rPr lang="en-US" sz="4400" smtClean="0">
+                <a:latin typeface="+mj-lt"/>
+              </a:rPr>
+              <a:t>is </a:t>
+            </a:r>
+            <a:r>
               <a:rPr lang="en-US" sz="4400" dirty="0" smtClean="0">
                 <a:latin typeface="+mj-lt"/>
               </a:rPr>
-              <a:t> or </a:t>
-            </a:r>
-            <a:r>
-              <a:rPr lang="en-US" sz="4400" u="sng" dirty="0" smtClean="0">
-                <a:latin typeface="+mj-lt"/>
-              </a:rPr>
-              <a:t>utility</a:t>
+              <a:t>pleasure </a:t>
             </a:r>
             <a:r>
               <a:rPr lang="en-US" sz="4400" dirty="0" smtClean="0">
                 <a:latin typeface="+mj-lt"/>
               </a:rPr>
-              <a:t> is pleasure in the absence of pain</a:t>
+              <a:t>and the </a:t>
+            </a:r>
+            <a:r>
+              <a:rPr lang="en-US" sz="4400" dirty="0" smtClean="0">
+                <a:latin typeface="+mj-lt"/>
+              </a:rPr>
+              <a:t>absence of pain</a:t>
             </a:r>
             <a:endParaRPr lang="en-US" sz="4400" dirty="0">
               <a:latin typeface="+mj-lt"/>

</xml_diff>